<commit_message>
AVD623 and AV224 updated till April 01
</commit_message>
<xml_diff>
--- a/2017_AV224/Material/Lecture_29.pptx
+++ b/2017_AV224/Material/Lecture_29.pptx
@@ -5,7 +5,7 @@
     <p:sldMasterId id="2147483648" r:id="rId1"/>
   </p:sldMasterIdLst>
   <p:notesMasterIdLst>
-    <p:notesMasterId r:id="rId19"/>
+    <p:notesMasterId r:id="rId11"/>
   </p:notesMasterIdLst>
   <p:sldIdLst>
     <p:sldId id="256" r:id="rId3"/>
@@ -14,16 +14,8 @@
     <p:sldId id="289" r:id="rId6"/>
     <p:sldId id="291" r:id="rId7"/>
     <p:sldId id="273" r:id="rId8"/>
-    <p:sldId id="274" r:id="rId9"/>
-    <p:sldId id="275" r:id="rId10"/>
-    <p:sldId id="276" r:id="rId11"/>
-    <p:sldId id="277" r:id="rId12"/>
-    <p:sldId id="283" r:id="rId13"/>
-    <p:sldId id="278" r:id="rId14"/>
-    <p:sldId id="279" r:id="rId15"/>
-    <p:sldId id="281" r:id="rId16"/>
-    <p:sldId id="282" r:id="rId17"/>
-    <p:sldId id="284" r:id="rId18"/>
+    <p:sldId id="305" r:id="rId9"/>
+    <p:sldId id="316" r:id="rId10"/>
   </p:sldIdLst>
   <p:sldSz cx="12192000" cy="6858000"/>
   <p:notesSz cx="6858000" cy="9144000"/>
@@ -3730,2253 +3722,6 @@
 </p:sld>
 </file>
 
-<file path=ppt/slides/slide10.xml><?xml version="1.0" encoding="utf-8"?>
-<p:sld xmlns:a="http://schemas.openxmlformats.org/drawingml/2006/main" xmlns:r="http://schemas.openxmlformats.org/officeDocument/2006/relationships" xmlns:p="http://schemas.openxmlformats.org/presentationml/2006/main">
-  <p:cSld>
-    <p:spTree>
-      <p:nvGrpSpPr>
-        <p:cNvPr id="1" name=""/>
-        <p:cNvGrpSpPr/>
-        <p:nvPr/>
-      </p:nvGrpSpPr>
-      <p:grpSpPr/>
-      <p:sp>
-        <p:nvSpPr>
-          <p:cNvPr id="4" name="Rectangle 3"/>
-          <p:cNvSpPr/>
-          <p:nvPr/>
-        </p:nvSpPr>
-        <p:spPr>
-          <a:xfrm>
-            <a:off x="-3175" y="-11430"/>
-            <a:ext cx="12186920" cy="102235"/>
-          </a:xfrm>
-          <a:prstGeom prst="rect">
-            <a:avLst/>
-          </a:prstGeom>
-        </p:spPr>
-        <p:style>
-          <a:lnRef idx="1">
-            <a:schemeClr val="accent1"/>
-          </a:lnRef>
-          <a:fillRef idx="2">
-            <a:schemeClr val="accent1"/>
-          </a:fillRef>
-          <a:effectRef idx="1">
-            <a:schemeClr val="accent1"/>
-          </a:effectRef>
-          <a:fontRef idx="minor">
-            <a:schemeClr val="dk1"/>
-          </a:fontRef>
-        </p:style>
-        <p:txBody>
-          <a:bodyPr rtlCol="0" anchor="ctr"/>
-          <a:p>
-            <a:pPr algn="ctr"/>
-            <a:endParaRPr lang="en-IN" altLang="en-US"/>
-          </a:p>
-        </p:txBody>
-      </p:sp>
-      <p:sp>
-        <p:nvSpPr>
-          <p:cNvPr id="5" name="Rectangle 4"/>
-          <p:cNvSpPr/>
-          <p:nvPr/>
-        </p:nvSpPr>
-        <p:spPr>
-          <a:xfrm>
-            <a:off x="-4445" y="6741160"/>
-            <a:ext cx="12186920" cy="102235"/>
-          </a:xfrm>
-          <a:prstGeom prst="rect">
-            <a:avLst/>
-          </a:prstGeom>
-        </p:spPr>
-        <p:style>
-          <a:lnRef idx="1">
-            <a:schemeClr val="accent1"/>
-          </a:lnRef>
-          <a:fillRef idx="2">
-            <a:schemeClr val="accent1"/>
-          </a:fillRef>
-          <a:effectRef idx="1">
-            <a:schemeClr val="accent1"/>
-          </a:effectRef>
-          <a:fontRef idx="minor">
-            <a:schemeClr val="dk1"/>
-          </a:fontRef>
-        </p:style>
-        <p:txBody>
-          <a:bodyPr rtlCol="0" anchor="ctr"/>
-          <a:p>
-            <a:pPr algn="ctr"/>
-            <a:endParaRPr lang="en-IN" altLang="en-US"/>
-          </a:p>
-        </p:txBody>
-      </p:sp>
-      <p:pic>
-        <p:nvPicPr>
-          <p:cNvPr id="6" name="Picture 5" descr="images"/>
-          <p:cNvPicPr>
-            <a:picLocks noChangeAspect="1"/>
-          </p:cNvPicPr>
-          <p:nvPr/>
-        </p:nvPicPr>
-        <p:blipFill>
-          <a:blip r:embed="rId1"/>
-          <a:stretch>
-            <a:fillRect/>
-          </a:stretch>
-        </p:blipFill>
-        <p:spPr>
-          <a:xfrm>
-            <a:off x="11468100" y="106680"/>
-            <a:ext cx="715645" cy="626110"/>
-          </a:xfrm>
-          <a:prstGeom prst="rect">
-            <a:avLst/>
-          </a:prstGeom>
-        </p:spPr>
-      </p:pic>
-      <p:sp>
-        <p:nvSpPr>
-          <p:cNvPr id="3" name="TextBox 2"/>
-          <p:cNvSpPr txBox="1"/>
-          <p:nvPr/>
-        </p:nvSpPr>
-        <p:spPr>
-          <a:xfrm>
-            <a:off x="114300" y="223520"/>
-            <a:ext cx="11232515" cy="383540"/>
-          </a:xfrm>
-          <a:prstGeom prst="rect">
-            <a:avLst/>
-          </a:prstGeom>
-          <a:noFill/>
-        </p:spPr>
-        <p:txBody>
-          <a:bodyPr wrap="square" rtlCol="0">
-            <a:spAutoFit/>
-          </a:bodyPr>
-          <a:p>
-            <a:r>
-              <a:rPr lang="x-none" altLang="en-IN"/>
-              <a:t>The boot process in more detail</a:t>
-            </a:r>
-            <a:endParaRPr lang="x-none" altLang="en-IN"/>
-          </a:p>
-        </p:txBody>
-      </p:sp>
-      <p:sp>
-        <p:nvSpPr>
-          <p:cNvPr id="7" name="TextBox 6"/>
-          <p:cNvSpPr txBox="1"/>
-          <p:nvPr/>
-        </p:nvSpPr>
-        <p:spPr>
-          <a:xfrm>
-            <a:off x="326390" y="776605"/>
-            <a:ext cx="11554460" cy="4498340"/>
-          </a:xfrm>
-          <a:prstGeom prst="rect">
-            <a:avLst/>
-          </a:prstGeom>
-          <a:noFill/>
-        </p:spPr>
-        <p:txBody>
-          <a:bodyPr wrap="square" rtlCol="0">
-            <a:spAutoFit/>
-          </a:bodyPr>
-          <a:p>
-            <a:r>
-              <a:rPr lang="x-none" altLang="en-IN"/>
-              <a:t>The boot loader</a:t>
-            </a:r>
-            <a:endParaRPr lang="x-none" altLang="en-IN"/>
-          </a:p>
-          <a:p>
-            <a:pPr marL="285750" indent="-285750">
-              <a:buFont typeface="Arial" charset="0"/>
-              <a:buChar char="•"/>
-            </a:pPr>
-            <a:r>
-              <a:rPr lang="x-none" altLang="en-IN"/>
-              <a:t>Starts executing a program called BIOS (basic input output system)</a:t>
-            </a:r>
-            <a:endParaRPr lang="x-none" altLang="en-IN"/>
-          </a:p>
-          <a:p>
-            <a:pPr marL="742950" lvl="1" indent="-285750">
-              <a:buFont typeface="Arial" charset="0"/>
-              <a:buChar char="•"/>
-            </a:pPr>
-            <a:r>
-              <a:rPr lang="x-none" altLang="en-IN"/>
-              <a:t>Stored in non-volatile storage on the motherboard</a:t>
-            </a:r>
-            <a:endParaRPr lang="x-none" altLang="en-IN"/>
-          </a:p>
-          <a:p>
-            <a:pPr marL="285750" lvl="0" indent="-285750">
-              <a:buFont typeface="Arial" charset="0"/>
-              <a:buChar char="•"/>
-            </a:pPr>
-            <a:r>
-              <a:rPr lang="x-none" altLang="en-IN"/>
-              <a:t>BIOS loads the first sector of the hard disk </a:t>
-            </a:r>
-            <a:endParaRPr lang="x-none" altLang="en-IN"/>
-          </a:p>
-          <a:p>
-            <a:pPr marL="742950" lvl="1" indent="-285750">
-              <a:buFont typeface="Arial" charset="0"/>
-              <a:buChar char="•"/>
-            </a:pPr>
-            <a:r>
-              <a:rPr lang="x-none" altLang="en-IN"/>
-              <a:t>The first 512 bytes (remember CHS)</a:t>
-            </a:r>
-            <a:endParaRPr lang="x-none" altLang="en-IN"/>
-          </a:p>
-          <a:p>
-            <a:pPr marL="742950" lvl="1" indent="-285750">
-              <a:buFont typeface="Arial" charset="0"/>
-              <a:buChar char="•"/>
-            </a:pPr>
-            <a:r>
-              <a:rPr lang="x-none" altLang="en-IN"/>
-              <a:t>This is also called the boot sector</a:t>
-            </a:r>
-            <a:endParaRPr lang="x-none" altLang="en-IN"/>
-          </a:p>
-          <a:p>
-            <a:pPr marL="742950" lvl="1" indent="-285750">
-              <a:buFont typeface="Arial" charset="0"/>
-              <a:buChar char="•"/>
-            </a:pPr>
-            <a:r>
-              <a:rPr lang="x-none" altLang="en-IN"/>
-              <a:t>Boot sector contains a boot loader</a:t>
-            </a:r>
-            <a:endParaRPr lang="x-none" altLang="en-IN"/>
-          </a:p>
-          <a:p>
-            <a:pPr marL="742950" lvl="1" indent="-285750">
-              <a:buFont typeface="Arial" charset="0"/>
-              <a:buChar char="•"/>
-            </a:pPr>
-            <a:r>
-              <a:rPr lang="x-none" altLang="en-IN"/>
-              <a:t>BIOS loads the boot loader from the boot sector to address 0x7c00 and then jumps to that</a:t>
-            </a:r>
-            <a:endParaRPr lang="x-none" altLang="en-IN"/>
-          </a:p>
-          <a:p>
-            <a:pPr marL="285750" lvl="0" indent="-285750">
-              <a:buFont typeface="Arial" charset="0"/>
-              <a:buChar char="•"/>
-            </a:pPr>
-            <a:r>
-              <a:rPr lang="x-none" altLang="en-IN"/>
-              <a:t>When the processor starts it emulates an 8088 processor</a:t>
-            </a:r>
-            <a:endParaRPr lang="x-none" altLang="en-IN"/>
-          </a:p>
-          <a:p>
-            <a:pPr marL="742950" lvl="1" indent="-285750">
-              <a:buFont typeface="Arial" charset="0"/>
-              <a:buChar char="•"/>
-            </a:pPr>
-            <a:r>
-              <a:rPr lang="x-none" altLang="en-IN"/>
-              <a:t>Bootloader should change from 8088 to the more modern processor (real to protected mode)</a:t>
-            </a:r>
-            <a:endParaRPr lang="x-none" altLang="en-IN"/>
-          </a:p>
-          <a:p>
-            <a:pPr marL="742950" lvl="1" indent="-285750">
-              <a:buFont typeface="Arial" charset="0"/>
-              <a:buChar char="•"/>
-            </a:pPr>
-            <a:r>
-              <a:rPr lang="x-none" altLang="en-IN"/>
-              <a:t>Load xv6 kernel into memory</a:t>
-            </a:r>
-            <a:endParaRPr lang="x-none" altLang="en-IN"/>
-          </a:p>
-          <a:p>
-            <a:pPr marL="742950" lvl="1" indent="-285750">
-              <a:buFont typeface="Arial" charset="0"/>
-              <a:buChar char="•"/>
-            </a:pPr>
-            <a:r>
-              <a:rPr lang="x-none" altLang="en-IN"/>
-              <a:t>Transfer control to the kernel</a:t>
-            </a:r>
-            <a:endParaRPr lang="x-none" altLang="en-IN"/>
-          </a:p>
-          <a:p>
-            <a:pPr marL="285750" lvl="0" indent="-285750">
-              <a:buFont typeface="Arial" charset="0"/>
-              <a:buChar char="•"/>
-            </a:pPr>
-            <a:r>
-              <a:rPr lang="x-none" altLang="en-IN"/>
-              <a:t>Booting is usually a two step process</a:t>
-            </a:r>
-            <a:endParaRPr lang="x-none" altLang="en-IN"/>
-          </a:p>
-          <a:p>
-            <a:pPr marL="285750" lvl="0" indent="-285750">
-              <a:buFont typeface="Arial" charset="0"/>
-              <a:buChar char="•"/>
-            </a:pPr>
-            <a:r>
-              <a:rPr lang="x-none" altLang="en-IN"/>
-              <a:t>UEFI - unified extensible firmware interface</a:t>
-            </a:r>
-            <a:endParaRPr lang="x-none" altLang="en-IN"/>
-          </a:p>
-          <a:p>
-            <a:pPr marL="742950" lvl="1" indent="-285750">
-              <a:buFont typeface="Arial" charset="0"/>
-              <a:buChar char="•"/>
-            </a:pPr>
-            <a:r>
-              <a:rPr lang="x-none" altLang="en-IN"/>
-              <a:t>allows for larger kernels to be read</a:t>
-            </a:r>
-            <a:endParaRPr lang="x-none" altLang="en-IN"/>
-          </a:p>
-          <a:p>
-            <a:pPr marL="742950" lvl="1" indent="-285750">
-              <a:buFont typeface="Arial" charset="0"/>
-              <a:buChar char="•"/>
-            </a:pPr>
-            <a:endParaRPr lang="x-none" altLang="en-IN"/>
-          </a:p>
-        </p:txBody>
-      </p:sp>
-    </p:spTree>
-  </p:cSld>
-  <p:clrMapOvr>
-    <a:masterClrMapping/>
-  </p:clrMapOvr>
-</p:sld>
-</file>
-
-<file path=ppt/slides/slide11.xml><?xml version="1.0" encoding="utf-8"?>
-<p:sld xmlns:a="http://schemas.openxmlformats.org/drawingml/2006/main" xmlns:r="http://schemas.openxmlformats.org/officeDocument/2006/relationships" xmlns:p="http://schemas.openxmlformats.org/presentationml/2006/main">
-  <p:cSld>
-    <p:spTree>
-      <p:nvGrpSpPr>
-        <p:cNvPr id="1" name=""/>
-        <p:cNvGrpSpPr/>
-        <p:nvPr/>
-      </p:nvGrpSpPr>
-      <p:grpSpPr/>
-      <p:pic>
-        <p:nvPicPr>
-          <p:cNvPr id="2" name="Picture 1"/>
-          <p:cNvPicPr>
-            <a:picLocks noChangeAspect="1"/>
-          </p:cNvPicPr>
-          <p:nvPr/>
-        </p:nvPicPr>
-        <p:blipFill>
-          <a:blip r:embed="rId1"/>
-          <a:stretch>
-            <a:fillRect/>
-          </a:stretch>
-        </p:blipFill>
-        <p:spPr>
-          <a:xfrm>
-            <a:off x="1955165" y="2792095"/>
-            <a:ext cx="7810500" cy="1956435"/>
-          </a:xfrm>
-          <a:prstGeom prst="rect">
-            <a:avLst/>
-          </a:prstGeom>
-        </p:spPr>
-      </p:pic>
-      <p:sp>
-        <p:nvSpPr>
-          <p:cNvPr id="4" name="Rectangle 3"/>
-          <p:cNvSpPr/>
-          <p:nvPr/>
-        </p:nvSpPr>
-        <p:spPr>
-          <a:xfrm>
-            <a:off x="-3175" y="-11430"/>
-            <a:ext cx="12186920" cy="102235"/>
-          </a:xfrm>
-          <a:prstGeom prst="rect">
-            <a:avLst/>
-          </a:prstGeom>
-        </p:spPr>
-        <p:style>
-          <a:lnRef idx="1">
-            <a:schemeClr val="accent1"/>
-          </a:lnRef>
-          <a:fillRef idx="2">
-            <a:schemeClr val="accent1"/>
-          </a:fillRef>
-          <a:effectRef idx="1">
-            <a:schemeClr val="accent1"/>
-          </a:effectRef>
-          <a:fontRef idx="minor">
-            <a:schemeClr val="dk1"/>
-          </a:fontRef>
-        </p:style>
-        <p:txBody>
-          <a:bodyPr rtlCol="0" anchor="ctr"/>
-          <a:p>
-            <a:pPr algn="ctr"/>
-            <a:endParaRPr lang="en-IN" altLang="en-US"/>
-          </a:p>
-        </p:txBody>
-      </p:sp>
-      <p:sp>
-        <p:nvSpPr>
-          <p:cNvPr id="5" name="Rectangle 4"/>
-          <p:cNvSpPr/>
-          <p:nvPr/>
-        </p:nvSpPr>
-        <p:spPr>
-          <a:xfrm>
-            <a:off x="-4445" y="6741160"/>
-            <a:ext cx="12186920" cy="102235"/>
-          </a:xfrm>
-          <a:prstGeom prst="rect">
-            <a:avLst/>
-          </a:prstGeom>
-        </p:spPr>
-        <p:style>
-          <a:lnRef idx="1">
-            <a:schemeClr val="accent1"/>
-          </a:lnRef>
-          <a:fillRef idx="2">
-            <a:schemeClr val="accent1"/>
-          </a:fillRef>
-          <a:effectRef idx="1">
-            <a:schemeClr val="accent1"/>
-          </a:effectRef>
-          <a:fontRef idx="minor">
-            <a:schemeClr val="dk1"/>
-          </a:fontRef>
-        </p:style>
-        <p:txBody>
-          <a:bodyPr rtlCol="0" anchor="ctr"/>
-          <a:p>
-            <a:pPr algn="ctr"/>
-            <a:endParaRPr lang="en-IN" altLang="en-US"/>
-          </a:p>
-        </p:txBody>
-      </p:sp>
-      <p:pic>
-        <p:nvPicPr>
-          <p:cNvPr id="6" name="Picture 5" descr="images"/>
-          <p:cNvPicPr>
-            <a:picLocks noChangeAspect="1"/>
-          </p:cNvPicPr>
-          <p:nvPr/>
-        </p:nvPicPr>
-        <p:blipFill>
-          <a:blip r:embed="rId2"/>
-          <a:stretch>
-            <a:fillRect/>
-          </a:stretch>
-        </p:blipFill>
-        <p:spPr>
-          <a:xfrm>
-            <a:off x="11468100" y="106680"/>
-            <a:ext cx="715645" cy="626110"/>
-          </a:xfrm>
-          <a:prstGeom prst="rect">
-            <a:avLst/>
-          </a:prstGeom>
-        </p:spPr>
-      </p:pic>
-      <p:sp>
-        <p:nvSpPr>
-          <p:cNvPr id="3" name="TextBox 2"/>
-          <p:cNvSpPr txBox="1"/>
-          <p:nvPr/>
-        </p:nvSpPr>
-        <p:spPr>
-          <a:xfrm>
-            <a:off x="114300" y="223520"/>
-            <a:ext cx="11232515" cy="383540"/>
-          </a:xfrm>
-          <a:prstGeom prst="rect">
-            <a:avLst/>
-          </a:prstGeom>
-          <a:noFill/>
-        </p:spPr>
-        <p:txBody>
-          <a:bodyPr wrap="square" rtlCol="0">
-            <a:spAutoFit/>
-          </a:bodyPr>
-          <a:p>
-            <a:r>
-              <a:rPr lang="x-none" altLang="en-IN"/>
-              <a:t>x86 Real and Protected mode</a:t>
-            </a:r>
-            <a:endParaRPr lang="x-none" altLang="en-IN"/>
-          </a:p>
-        </p:txBody>
-      </p:sp>
-      <p:sp>
-        <p:nvSpPr>
-          <p:cNvPr id="9" name="TextBox 8"/>
-          <p:cNvSpPr txBox="1"/>
-          <p:nvPr/>
-        </p:nvSpPr>
-        <p:spPr>
-          <a:xfrm>
-            <a:off x="224155" y="738505"/>
-            <a:ext cx="11630660" cy="5046980"/>
-          </a:xfrm>
-          <a:prstGeom prst="rect">
-            <a:avLst/>
-          </a:prstGeom>
-          <a:noFill/>
-        </p:spPr>
-        <p:txBody>
-          <a:bodyPr wrap="square" rtlCol="0">
-            <a:spAutoFit/>
-          </a:bodyPr>
-          <a:p>
-            <a:r>
-              <a:rPr lang="x-none" altLang="en-IN"/>
-              <a:t>Real mode</a:t>
-            </a:r>
-            <a:endParaRPr lang="x-none" altLang="en-IN"/>
-          </a:p>
-          <a:p>
-            <a:pPr marL="285750" indent="-285750">
-              <a:buFont typeface="Arial" charset="0"/>
-              <a:buChar char="•"/>
-            </a:pPr>
-            <a:r>
-              <a:rPr lang="x-none" altLang="en-IN"/>
-              <a:t>8 16 bit registers</a:t>
-            </a:r>
-            <a:endParaRPr lang="x-none" altLang="en-IN"/>
-          </a:p>
-          <a:p>
-            <a:pPr marL="285750" indent="-285750">
-              <a:buFont typeface="Arial" charset="0"/>
-              <a:buChar char="•"/>
-            </a:pPr>
-            <a:r>
-              <a:rPr lang="x-none" altLang="en-IN"/>
-              <a:t>20 bit address</a:t>
-            </a:r>
-            <a:endParaRPr lang="x-none" altLang="en-IN"/>
-          </a:p>
-          <a:p>
-            <a:pPr marL="285750" indent="-285750">
-              <a:buFont typeface="Arial" charset="0"/>
-              <a:buChar char="•"/>
-            </a:pPr>
-            <a:r>
-              <a:rPr lang="x-none" altLang="en-IN"/>
-              <a:t>Segment registers for additional bits</a:t>
-            </a:r>
-            <a:endParaRPr lang="x-none" altLang="en-IN"/>
-          </a:p>
-          <a:p>
-            <a:pPr marL="742950" lvl="1" indent="-285750">
-              <a:buFont typeface="Arial" charset="0"/>
-              <a:buChar char="•"/>
-            </a:pPr>
-            <a:r>
-              <a:rPr lang="x-none" altLang="en-IN"/>
-              <a:t>Multiple segment registers by 16 and add to other registers</a:t>
-            </a:r>
-            <a:endParaRPr lang="x-none" altLang="en-IN"/>
-          </a:p>
-          <a:p>
-            <a:pPr marL="742950" lvl="1" indent="-285750">
-              <a:buFont typeface="Arial" charset="0"/>
-              <a:buChar char="•"/>
-            </a:pPr>
-            <a:r>
-              <a:rPr lang="x-none" altLang="en-IN"/>
-              <a:t>21 bit segment:offset address</a:t>
-            </a:r>
-            <a:endParaRPr lang="x-none" altLang="en-IN"/>
-          </a:p>
-          <a:p>
-            <a:pPr marL="285750" lvl="0" indent="-285750">
-              <a:buFont typeface="Arial" charset="0"/>
-              <a:buChar char="•"/>
-            </a:pPr>
-            <a:r>
-              <a:rPr lang="x-none" altLang="en-IN"/>
-              <a:t>Addressing in x86 is a little complicated ...</a:t>
-            </a:r>
-            <a:endParaRPr lang="x-none" altLang="en-IN"/>
-          </a:p>
-          <a:p>
-            <a:pPr marL="285750" lvl="0" indent="-285750">
-              <a:buFont typeface="Arial" charset="0"/>
-              <a:buChar char="•"/>
-            </a:pPr>
-            <a:endParaRPr lang="x-none" altLang="en-IN"/>
-          </a:p>
-          <a:p>
-            <a:pPr marL="285750" lvl="0" indent="-285750">
-              <a:buFont typeface="Arial" charset="0"/>
-              <a:buChar char="•"/>
-            </a:pPr>
-            <a:endParaRPr lang="x-none" altLang="en-IN"/>
-          </a:p>
-          <a:p>
-            <a:pPr marL="285750" lvl="0" indent="-285750">
-              <a:buFont typeface="Arial" charset="0"/>
-              <a:buChar char="•"/>
-            </a:pPr>
-            <a:endParaRPr lang="x-none" altLang="en-IN"/>
-          </a:p>
-          <a:p>
-            <a:pPr marL="285750" lvl="0" indent="-285750">
-              <a:buFont typeface="Arial" charset="0"/>
-              <a:buChar char="•"/>
-            </a:pPr>
-            <a:endParaRPr lang="x-none" altLang="en-IN"/>
-          </a:p>
-          <a:p>
-            <a:pPr marL="285750" lvl="0" indent="-285750">
-              <a:buFont typeface="Arial" charset="0"/>
-              <a:buChar char="•"/>
-            </a:pPr>
-            <a:endParaRPr lang="x-none" altLang="en-IN"/>
-          </a:p>
-          <a:p>
-            <a:pPr marL="285750" lvl="0" indent="-285750">
-              <a:buFont typeface="Arial" charset="0"/>
-              <a:buChar char="•"/>
-            </a:pPr>
-            <a:endParaRPr lang="x-none" altLang="en-IN"/>
-          </a:p>
-          <a:p>
-            <a:pPr marL="285750" lvl="0" indent="-285750">
-              <a:buFont typeface="Arial" charset="0"/>
-              <a:buChar char="•"/>
-            </a:pPr>
-            <a:endParaRPr lang="x-none" altLang="en-IN"/>
-          </a:p>
-          <a:p>
-            <a:pPr marL="285750" lvl="0" indent="-285750">
-              <a:buFont typeface="Arial" charset="0"/>
-              <a:buChar char="•"/>
-            </a:pPr>
-            <a:endParaRPr lang="x-none" altLang="en-IN"/>
-          </a:p>
-          <a:p>
-            <a:pPr marL="285750" lvl="0" indent="-285750">
-              <a:buFont typeface="Arial" charset="0"/>
-              <a:buChar char="•"/>
-            </a:pPr>
-            <a:r>
-              <a:rPr lang="x-none" altLang="en-IN"/>
-              <a:t>Bootloader does not use paging - linear addresses are physical addresses</a:t>
-            </a:r>
-            <a:endParaRPr lang="x-none" altLang="en-IN"/>
-          </a:p>
-          <a:p>
-            <a:pPr marL="285750" lvl="0" indent="-285750">
-              <a:buFont typeface="Arial" charset="0"/>
-              <a:buChar char="•"/>
-            </a:pPr>
-            <a:r>
-              <a:rPr lang="x-none" altLang="en-IN"/>
-              <a:t>Under xv6 </a:t>
-            </a:r>
-            <a:endParaRPr lang="x-none" altLang="en-IN"/>
-          </a:p>
-          <a:p>
-            <a:pPr marL="742950" lvl="1" indent="-285750">
-              <a:buFont typeface="Arial" charset="0"/>
-              <a:buChar char="•"/>
-            </a:pPr>
-            <a:r>
-              <a:rPr lang="x-none" altLang="en-IN"/>
-              <a:t>x86 logical addresses = xv6 virtual addresses</a:t>
-            </a:r>
-            <a:endParaRPr lang="x-none" altLang="en-IN"/>
-          </a:p>
-        </p:txBody>
-      </p:sp>
-    </p:spTree>
-  </p:cSld>
-  <p:clrMapOvr>
-    <a:masterClrMapping/>
-  </p:clrMapOvr>
-</p:sld>
-</file>
-
-<file path=ppt/slides/slide12.xml><?xml version="1.0" encoding="utf-8"?>
-<p:sld xmlns:a="http://schemas.openxmlformats.org/drawingml/2006/main" xmlns:r="http://schemas.openxmlformats.org/officeDocument/2006/relationships" xmlns:p="http://schemas.openxmlformats.org/presentationml/2006/main">
-  <p:cSld>
-    <p:spTree>
-      <p:nvGrpSpPr>
-        <p:cNvPr id="1" name=""/>
-        <p:cNvGrpSpPr/>
-        <p:nvPr/>
-      </p:nvGrpSpPr>
-      <p:grpSpPr/>
-      <p:sp>
-        <p:nvSpPr>
-          <p:cNvPr id="4" name="Rectangle 3"/>
-          <p:cNvSpPr/>
-          <p:nvPr/>
-        </p:nvSpPr>
-        <p:spPr>
-          <a:xfrm>
-            <a:off x="-3175" y="-11430"/>
-            <a:ext cx="12186920" cy="102235"/>
-          </a:xfrm>
-          <a:prstGeom prst="rect">
-            <a:avLst/>
-          </a:prstGeom>
-        </p:spPr>
-        <p:style>
-          <a:lnRef idx="1">
-            <a:schemeClr val="accent1"/>
-          </a:lnRef>
-          <a:fillRef idx="2">
-            <a:schemeClr val="accent1"/>
-          </a:fillRef>
-          <a:effectRef idx="1">
-            <a:schemeClr val="accent1"/>
-          </a:effectRef>
-          <a:fontRef idx="minor">
-            <a:schemeClr val="dk1"/>
-          </a:fontRef>
-        </p:style>
-        <p:txBody>
-          <a:bodyPr rtlCol="0" anchor="ctr"/>
-          <a:p>
-            <a:pPr algn="ctr"/>
-            <a:endParaRPr lang="en-IN" altLang="en-US"/>
-          </a:p>
-        </p:txBody>
-      </p:sp>
-      <p:sp>
-        <p:nvSpPr>
-          <p:cNvPr id="5" name="Rectangle 4"/>
-          <p:cNvSpPr/>
-          <p:nvPr/>
-        </p:nvSpPr>
-        <p:spPr>
-          <a:xfrm>
-            <a:off x="-4445" y="6741160"/>
-            <a:ext cx="12186920" cy="102235"/>
-          </a:xfrm>
-          <a:prstGeom prst="rect">
-            <a:avLst/>
-          </a:prstGeom>
-        </p:spPr>
-        <p:style>
-          <a:lnRef idx="1">
-            <a:schemeClr val="accent1"/>
-          </a:lnRef>
-          <a:fillRef idx="2">
-            <a:schemeClr val="accent1"/>
-          </a:fillRef>
-          <a:effectRef idx="1">
-            <a:schemeClr val="accent1"/>
-          </a:effectRef>
-          <a:fontRef idx="minor">
-            <a:schemeClr val="dk1"/>
-          </a:fontRef>
-        </p:style>
-        <p:txBody>
-          <a:bodyPr rtlCol="0" anchor="ctr"/>
-          <a:p>
-            <a:pPr algn="ctr"/>
-            <a:endParaRPr lang="en-IN" altLang="en-US"/>
-          </a:p>
-        </p:txBody>
-      </p:sp>
-      <p:pic>
-        <p:nvPicPr>
-          <p:cNvPr id="6" name="Picture 5" descr="images"/>
-          <p:cNvPicPr>
-            <a:picLocks noChangeAspect="1"/>
-          </p:cNvPicPr>
-          <p:nvPr/>
-        </p:nvPicPr>
-        <p:blipFill>
-          <a:blip r:embed="rId1"/>
-          <a:stretch>
-            <a:fillRect/>
-          </a:stretch>
-        </p:blipFill>
-        <p:spPr>
-          <a:xfrm>
-            <a:off x="11468100" y="106680"/>
-            <a:ext cx="715645" cy="626110"/>
-          </a:xfrm>
-          <a:prstGeom prst="rect">
-            <a:avLst/>
-          </a:prstGeom>
-        </p:spPr>
-      </p:pic>
-      <p:sp>
-        <p:nvSpPr>
-          <p:cNvPr id="3" name="TextBox 2"/>
-          <p:cNvSpPr txBox="1"/>
-          <p:nvPr/>
-        </p:nvSpPr>
-        <p:spPr>
-          <a:xfrm>
-            <a:off x="114300" y="223520"/>
-            <a:ext cx="11232515" cy="383540"/>
-          </a:xfrm>
-          <a:prstGeom prst="rect">
-            <a:avLst/>
-          </a:prstGeom>
-          <a:noFill/>
-        </p:spPr>
-        <p:txBody>
-          <a:bodyPr wrap="square" rtlCol="0">
-            <a:spAutoFit/>
-          </a:bodyPr>
-          <a:p>
-            <a:r>
-              <a:rPr lang="x-none" altLang="en-IN"/>
-              <a:t>Code overview</a:t>
-            </a:r>
-            <a:endParaRPr lang="x-none" altLang="en-IN"/>
-          </a:p>
-        </p:txBody>
-      </p:sp>
-      <p:pic>
-        <p:nvPicPr>
-          <p:cNvPr id="2" name="Picture 1"/>
-          <p:cNvPicPr>
-            <a:picLocks noChangeAspect="1"/>
-          </p:cNvPicPr>
-          <p:nvPr/>
-        </p:nvPicPr>
-        <p:blipFill>
-          <a:blip r:embed="rId2"/>
-          <a:stretch>
-            <a:fillRect/>
-          </a:stretch>
-        </p:blipFill>
-        <p:spPr>
-          <a:xfrm>
-            <a:off x="3241675" y="247015"/>
-            <a:ext cx="5707380" cy="6111875"/>
-          </a:xfrm>
-          <a:prstGeom prst="rect">
-            <a:avLst/>
-          </a:prstGeom>
-        </p:spPr>
-      </p:pic>
-      <p:sp>
-        <p:nvSpPr>
-          <p:cNvPr id="8" name="Right Arrow 7"/>
-          <p:cNvSpPr/>
-          <p:nvPr/>
-        </p:nvSpPr>
-        <p:spPr>
-          <a:xfrm>
-            <a:off x="314960" y="1704340"/>
-            <a:ext cx="2856230" cy="553085"/>
-          </a:xfrm>
-          <a:prstGeom prst="rightArrow">
-            <a:avLst/>
-          </a:prstGeom>
-        </p:spPr>
-        <p:style>
-          <a:lnRef idx="2">
-            <a:schemeClr val="accent1">
-              <a:shade val="50000"/>
-            </a:schemeClr>
-          </a:lnRef>
-          <a:fillRef idx="1">
-            <a:schemeClr val="accent1"/>
-          </a:fillRef>
-          <a:effectRef idx="0">
-            <a:schemeClr val="accent1"/>
-          </a:effectRef>
-          <a:fontRef idx="minor">
-            <a:schemeClr val="lt1"/>
-          </a:fontRef>
-        </p:style>
-        <p:txBody>
-          <a:bodyPr rtlCol="0" anchor="ctr"/>
-          <a:p>
-            <a:pPr algn="ctr"/>
-            <a:r>
-              <a:rPr lang="x-none" altLang="en-IN"/>
-              <a:t>Disable interrupts</a:t>
-            </a:r>
-            <a:endParaRPr lang="x-none" altLang="en-IN"/>
-          </a:p>
-        </p:txBody>
-      </p:sp>
-      <p:sp>
-        <p:nvSpPr>
-          <p:cNvPr id="10" name="Right Arrow 9"/>
-          <p:cNvSpPr/>
-          <p:nvPr/>
-        </p:nvSpPr>
-        <p:spPr>
-          <a:xfrm>
-            <a:off x="326390" y="2397125"/>
-            <a:ext cx="2856230" cy="553085"/>
-          </a:xfrm>
-          <a:prstGeom prst="rightArrow">
-            <a:avLst/>
-          </a:prstGeom>
-        </p:spPr>
-        <p:style>
-          <a:lnRef idx="2">
-            <a:schemeClr val="accent1">
-              <a:shade val="50000"/>
-            </a:schemeClr>
-          </a:lnRef>
-          <a:fillRef idx="1">
-            <a:schemeClr val="accent1"/>
-          </a:fillRef>
-          <a:effectRef idx="0">
-            <a:schemeClr val="accent1"/>
-          </a:effectRef>
-          <a:fontRef idx="minor">
-            <a:schemeClr val="lt1"/>
-          </a:fontRef>
-        </p:style>
-        <p:txBody>
-          <a:bodyPr rtlCol="0" anchor="ctr"/>
-          <a:p>
-            <a:pPr algn="ctr"/>
-            <a:r>
-              <a:rPr lang="x-none" altLang="en-IN" sz="1400"/>
-              <a:t>Initialize to known values</a:t>
-            </a:r>
-            <a:endParaRPr lang="x-none" altLang="en-IN" sz="1400"/>
-          </a:p>
-        </p:txBody>
-      </p:sp>
-      <p:sp>
-        <p:nvSpPr>
-          <p:cNvPr id="11" name="Left Brace 10"/>
-          <p:cNvSpPr/>
-          <p:nvPr/>
-        </p:nvSpPr>
-        <p:spPr>
-          <a:xfrm>
-            <a:off x="2489200" y="3338195"/>
-            <a:ext cx="758825" cy="1994535"/>
-          </a:xfrm>
-          <a:prstGeom prst="leftBrace">
-            <a:avLst>
-              <a:gd name="adj1" fmla="val 8333"/>
-              <a:gd name="adj2" fmla="val 50015"/>
-            </a:avLst>
-          </a:prstGeom>
-          <a:ln w="57150">
-            <a:solidFill>
-              <a:schemeClr val="accent1"/>
-            </a:solidFill>
-          </a:ln>
-        </p:spPr>
-        <p:style>
-          <a:lnRef idx="1">
-            <a:schemeClr val="accent1"/>
-          </a:lnRef>
-          <a:fillRef idx="0">
-            <a:schemeClr val="accent1"/>
-          </a:fillRef>
-          <a:effectRef idx="0">
-            <a:schemeClr val="accent1"/>
-          </a:effectRef>
-          <a:fontRef idx="minor">
-            <a:schemeClr val="tx1"/>
-          </a:fontRef>
-        </p:style>
-        <p:txBody>
-          <a:bodyPr rtlCol="0" anchor="ctr"/>
-          <a:p>
-            <a:pPr algn="ctr"/>
-            <a:endParaRPr lang="en-IN" altLang="en-US"/>
-          </a:p>
-        </p:txBody>
-      </p:sp>
-      <p:sp>
-        <p:nvSpPr>
-          <p:cNvPr id="12" name="TextBox 11"/>
-          <p:cNvSpPr txBox="1"/>
-          <p:nvPr/>
-        </p:nvSpPr>
-        <p:spPr>
-          <a:xfrm>
-            <a:off x="378460" y="3827145"/>
-            <a:ext cx="1840230" cy="932180"/>
-          </a:xfrm>
-          <a:prstGeom prst="rect">
-            <a:avLst/>
-          </a:prstGeom>
-          <a:noFill/>
-        </p:spPr>
-        <p:txBody>
-          <a:bodyPr wrap="square" rtlCol="0">
-            <a:spAutoFit/>
-          </a:bodyPr>
-          <a:p>
-            <a:r>
-              <a:rPr lang="x-none" altLang="en-IN"/>
-              <a:t>Hack for handling the 21st bit</a:t>
-            </a:r>
-            <a:endParaRPr lang="x-none" altLang="en-IN"/>
-          </a:p>
-        </p:txBody>
-      </p:sp>
-      <p:pic>
-        <p:nvPicPr>
-          <p:cNvPr id="13" name="Picture 12"/>
-          <p:cNvPicPr>
-            <a:picLocks noChangeAspect="1"/>
-          </p:cNvPicPr>
-          <p:nvPr/>
-        </p:nvPicPr>
-        <p:blipFill>
-          <a:blip r:embed="rId3"/>
-          <a:stretch>
-            <a:fillRect/>
-          </a:stretch>
-        </p:blipFill>
-        <p:spPr>
-          <a:xfrm>
-            <a:off x="8421370" y="2784475"/>
-            <a:ext cx="3609340" cy="2190750"/>
-          </a:xfrm>
-          <a:prstGeom prst="rect">
-            <a:avLst/>
-          </a:prstGeom>
-        </p:spPr>
-      </p:pic>
-    </p:spTree>
-  </p:cSld>
-  <p:clrMapOvr>
-    <a:masterClrMapping/>
-  </p:clrMapOvr>
-</p:sld>
-</file>
-
-<file path=ppt/slides/slide13.xml><?xml version="1.0" encoding="utf-8"?>
-<p:sld xmlns:a="http://schemas.openxmlformats.org/drawingml/2006/main" xmlns:r="http://schemas.openxmlformats.org/officeDocument/2006/relationships" xmlns:p="http://schemas.openxmlformats.org/presentationml/2006/main">
-  <p:cSld>
-    <p:spTree>
-      <p:nvGrpSpPr>
-        <p:cNvPr id="1" name=""/>
-        <p:cNvGrpSpPr/>
-        <p:nvPr/>
-      </p:nvGrpSpPr>
-      <p:grpSpPr/>
-      <p:sp>
-        <p:nvSpPr>
-          <p:cNvPr id="4" name="Rectangle 3"/>
-          <p:cNvSpPr/>
-          <p:nvPr/>
-        </p:nvSpPr>
-        <p:spPr>
-          <a:xfrm>
-            <a:off x="-3175" y="-11430"/>
-            <a:ext cx="12186920" cy="102235"/>
-          </a:xfrm>
-          <a:prstGeom prst="rect">
-            <a:avLst/>
-          </a:prstGeom>
-        </p:spPr>
-        <p:style>
-          <a:lnRef idx="1">
-            <a:schemeClr val="accent1"/>
-          </a:lnRef>
-          <a:fillRef idx="2">
-            <a:schemeClr val="accent1"/>
-          </a:fillRef>
-          <a:effectRef idx="1">
-            <a:schemeClr val="accent1"/>
-          </a:effectRef>
-          <a:fontRef idx="minor">
-            <a:schemeClr val="dk1"/>
-          </a:fontRef>
-        </p:style>
-        <p:txBody>
-          <a:bodyPr rtlCol="0" anchor="ctr"/>
-          <a:p>
-            <a:pPr algn="ctr"/>
-            <a:endParaRPr lang="en-IN" altLang="en-US"/>
-          </a:p>
-        </p:txBody>
-      </p:sp>
-      <p:sp>
-        <p:nvSpPr>
-          <p:cNvPr id="5" name="Rectangle 4"/>
-          <p:cNvSpPr/>
-          <p:nvPr/>
-        </p:nvSpPr>
-        <p:spPr>
-          <a:xfrm>
-            <a:off x="-4445" y="6741160"/>
-            <a:ext cx="12186920" cy="102235"/>
-          </a:xfrm>
-          <a:prstGeom prst="rect">
-            <a:avLst/>
-          </a:prstGeom>
-        </p:spPr>
-        <p:style>
-          <a:lnRef idx="1">
-            <a:schemeClr val="accent1"/>
-          </a:lnRef>
-          <a:fillRef idx="2">
-            <a:schemeClr val="accent1"/>
-          </a:fillRef>
-          <a:effectRef idx="1">
-            <a:schemeClr val="accent1"/>
-          </a:effectRef>
-          <a:fontRef idx="minor">
-            <a:schemeClr val="dk1"/>
-          </a:fontRef>
-        </p:style>
-        <p:txBody>
-          <a:bodyPr rtlCol="0" anchor="ctr"/>
-          <a:p>
-            <a:pPr algn="ctr"/>
-            <a:endParaRPr lang="en-IN" altLang="en-US"/>
-          </a:p>
-        </p:txBody>
-      </p:sp>
-      <p:pic>
-        <p:nvPicPr>
-          <p:cNvPr id="6" name="Picture 5" descr="images"/>
-          <p:cNvPicPr>
-            <a:picLocks noChangeAspect="1"/>
-          </p:cNvPicPr>
-          <p:nvPr/>
-        </p:nvPicPr>
-        <p:blipFill>
-          <a:blip r:embed="rId1"/>
-          <a:stretch>
-            <a:fillRect/>
-          </a:stretch>
-        </p:blipFill>
-        <p:spPr>
-          <a:xfrm>
-            <a:off x="11468100" y="106680"/>
-            <a:ext cx="715645" cy="626110"/>
-          </a:xfrm>
-          <a:prstGeom prst="rect">
-            <a:avLst/>
-          </a:prstGeom>
-        </p:spPr>
-      </p:pic>
-      <p:sp>
-        <p:nvSpPr>
-          <p:cNvPr id="3" name="TextBox 2"/>
-          <p:cNvSpPr txBox="1"/>
-          <p:nvPr/>
-        </p:nvSpPr>
-        <p:spPr>
-          <a:xfrm>
-            <a:off x="114300" y="223520"/>
-            <a:ext cx="11232515" cy="383540"/>
-          </a:xfrm>
-          <a:prstGeom prst="rect">
-            <a:avLst/>
-          </a:prstGeom>
-          <a:noFill/>
-        </p:spPr>
-        <p:txBody>
-          <a:bodyPr wrap="square" rtlCol="0">
-            <a:spAutoFit/>
-          </a:bodyPr>
-          <a:p>
-            <a:r>
-              <a:rPr lang="x-none" altLang="en-IN"/>
-              <a:t>Code overview</a:t>
-            </a:r>
-            <a:endParaRPr lang="x-none" altLang="en-IN"/>
-          </a:p>
-        </p:txBody>
-      </p:sp>
-      <p:pic>
-        <p:nvPicPr>
-          <p:cNvPr id="7" name="Picture 6"/>
-          <p:cNvPicPr>
-            <a:picLocks noChangeAspect="1"/>
-          </p:cNvPicPr>
-          <p:nvPr/>
-        </p:nvPicPr>
-        <p:blipFill>
-          <a:blip r:embed="rId2"/>
-          <a:stretch>
-            <a:fillRect/>
-          </a:stretch>
-        </p:blipFill>
-        <p:spPr>
-          <a:xfrm>
-            <a:off x="3536950" y="485140"/>
-            <a:ext cx="5542280" cy="5991225"/>
-          </a:xfrm>
-          <a:prstGeom prst="rect">
-            <a:avLst/>
-          </a:prstGeom>
-        </p:spPr>
-      </p:pic>
-      <p:sp>
-        <p:nvSpPr>
-          <p:cNvPr id="8" name="Right Arrow 7"/>
-          <p:cNvSpPr/>
-          <p:nvPr/>
-        </p:nvSpPr>
-        <p:spPr>
-          <a:xfrm>
-            <a:off x="956945" y="661670"/>
-            <a:ext cx="2637790" cy="655955"/>
-          </a:xfrm>
-          <a:prstGeom prst="rightArrow">
-            <a:avLst/>
-          </a:prstGeom>
-        </p:spPr>
-        <p:style>
-          <a:lnRef idx="2">
-            <a:schemeClr val="accent1">
-              <a:shade val="50000"/>
-            </a:schemeClr>
-          </a:lnRef>
-          <a:fillRef idx="1">
-            <a:schemeClr val="accent1"/>
-          </a:fillRef>
-          <a:effectRef idx="0">
-            <a:schemeClr val="accent1"/>
-          </a:effectRef>
-          <a:fontRef idx="minor">
-            <a:schemeClr val="lt1"/>
-          </a:fontRef>
-        </p:style>
-        <p:txBody>
-          <a:bodyPr rtlCol="0" anchor="ctr"/>
-          <a:p>
-            <a:pPr algn="ctr"/>
-            <a:r>
-              <a:rPr lang="x-none" altLang="en-IN"/>
-              <a:t>Start using GDT</a:t>
-            </a:r>
-            <a:endParaRPr lang="x-none" altLang="en-IN"/>
-          </a:p>
-        </p:txBody>
-      </p:sp>
-      <p:sp>
-        <p:nvSpPr>
-          <p:cNvPr id="9" name="Right Arrow 8"/>
-          <p:cNvSpPr/>
-          <p:nvPr/>
-        </p:nvSpPr>
-        <p:spPr>
-          <a:xfrm>
-            <a:off x="916940" y="2834005"/>
-            <a:ext cx="2637790" cy="655955"/>
-          </a:xfrm>
-          <a:prstGeom prst="rightArrow">
-            <a:avLst/>
-          </a:prstGeom>
-        </p:spPr>
-        <p:style>
-          <a:lnRef idx="2">
-            <a:schemeClr val="accent1">
-              <a:shade val="50000"/>
-            </a:schemeClr>
-          </a:lnRef>
-          <a:fillRef idx="1">
-            <a:schemeClr val="accent1"/>
-          </a:fillRef>
-          <a:effectRef idx="0">
-            <a:schemeClr val="accent1"/>
-          </a:effectRef>
-          <a:fontRef idx="minor">
-            <a:schemeClr val="lt1"/>
-          </a:fontRef>
-        </p:style>
-        <p:txBody>
-          <a:bodyPr rtlCol="0" anchor="ctr"/>
-          <a:p>
-            <a:pPr algn="ctr"/>
-            <a:r>
-              <a:rPr lang="x-none" altLang="en-IN"/>
-              <a:t>Setup stack for kernel</a:t>
-            </a:r>
-            <a:endParaRPr lang="x-none" altLang="en-IN"/>
-          </a:p>
-        </p:txBody>
-      </p:sp>
-      <p:sp>
-        <p:nvSpPr>
-          <p:cNvPr id="10" name="Right Arrow 9"/>
-          <p:cNvSpPr/>
-          <p:nvPr/>
-        </p:nvSpPr>
-        <p:spPr>
-          <a:xfrm>
-            <a:off x="915035" y="4286250"/>
-            <a:ext cx="2637790" cy="655955"/>
-          </a:xfrm>
-          <a:prstGeom prst="rightArrow">
-            <a:avLst/>
-          </a:prstGeom>
-        </p:spPr>
-        <p:style>
-          <a:lnRef idx="2">
-            <a:schemeClr val="accent1">
-              <a:shade val="50000"/>
-            </a:schemeClr>
-          </a:lnRef>
-          <a:fillRef idx="1">
-            <a:schemeClr val="accent1"/>
-          </a:fillRef>
-          <a:effectRef idx="0">
-            <a:schemeClr val="accent1"/>
-          </a:effectRef>
-          <a:fontRef idx="minor">
-            <a:schemeClr val="lt1"/>
-          </a:fontRef>
-        </p:style>
-        <p:txBody>
-          <a:bodyPr rtlCol="0" anchor="ctr"/>
-          <a:p>
-            <a:pPr algn="ctr"/>
-            <a:r>
-              <a:rPr lang="x-none" altLang="en-IN"/>
-              <a:t>Infinite loop</a:t>
-            </a:r>
-            <a:endParaRPr lang="x-none" altLang="en-IN"/>
-          </a:p>
-        </p:txBody>
-      </p:sp>
-    </p:spTree>
-  </p:cSld>
-  <p:clrMapOvr>
-    <a:masterClrMapping/>
-  </p:clrMapOvr>
-</p:sld>
-</file>
-
-<file path=ppt/slides/slide14.xml><?xml version="1.0" encoding="utf-8"?>
-<p:sld xmlns:a="http://schemas.openxmlformats.org/drawingml/2006/main" xmlns:r="http://schemas.openxmlformats.org/officeDocument/2006/relationships" xmlns:p="http://schemas.openxmlformats.org/presentationml/2006/main">
-  <p:cSld>
-    <p:spTree>
-      <p:nvGrpSpPr>
-        <p:cNvPr id="1" name=""/>
-        <p:cNvGrpSpPr/>
-        <p:nvPr/>
-      </p:nvGrpSpPr>
-      <p:grpSpPr/>
-      <p:sp>
-        <p:nvSpPr>
-          <p:cNvPr id="4" name="Rectangle 3"/>
-          <p:cNvSpPr/>
-          <p:nvPr/>
-        </p:nvSpPr>
-        <p:spPr>
-          <a:xfrm>
-            <a:off x="-3175" y="-11430"/>
-            <a:ext cx="12186920" cy="102235"/>
-          </a:xfrm>
-          <a:prstGeom prst="rect">
-            <a:avLst/>
-          </a:prstGeom>
-        </p:spPr>
-        <p:style>
-          <a:lnRef idx="1">
-            <a:schemeClr val="accent1"/>
-          </a:lnRef>
-          <a:fillRef idx="2">
-            <a:schemeClr val="accent1"/>
-          </a:fillRef>
-          <a:effectRef idx="1">
-            <a:schemeClr val="accent1"/>
-          </a:effectRef>
-          <a:fontRef idx="minor">
-            <a:schemeClr val="dk1"/>
-          </a:fontRef>
-        </p:style>
-        <p:txBody>
-          <a:bodyPr rtlCol="0" anchor="ctr"/>
-          <a:p>
-            <a:pPr algn="ctr"/>
-            <a:endParaRPr lang="en-IN" altLang="en-US"/>
-          </a:p>
-        </p:txBody>
-      </p:sp>
-      <p:sp>
-        <p:nvSpPr>
-          <p:cNvPr id="5" name="Rectangle 4"/>
-          <p:cNvSpPr/>
-          <p:nvPr/>
-        </p:nvSpPr>
-        <p:spPr>
-          <a:xfrm>
-            <a:off x="-4445" y="6741160"/>
-            <a:ext cx="12186920" cy="102235"/>
-          </a:xfrm>
-          <a:prstGeom prst="rect">
-            <a:avLst/>
-          </a:prstGeom>
-        </p:spPr>
-        <p:style>
-          <a:lnRef idx="1">
-            <a:schemeClr val="accent1"/>
-          </a:lnRef>
-          <a:fillRef idx="2">
-            <a:schemeClr val="accent1"/>
-          </a:fillRef>
-          <a:effectRef idx="1">
-            <a:schemeClr val="accent1"/>
-          </a:effectRef>
-          <a:fontRef idx="minor">
-            <a:schemeClr val="dk1"/>
-          </a:fontRef>
-        </p:style>
-        <p:txBody>
-          <a:bodyPr rtlCol="0" anchor="ctr"/>
-          <a:p>
-            <a:pPr algn="ctr"/>
-            <a:endParaRPr lang="en-IN" altLang="en-US"/>
-          </a:p>
-        </p:txBody>
-      </p:sp>
-      <p:pic>
-        <p:nvPicPr>
-          <p:cNvPr id="6" name="Picture 5" descr="images"/>
-          <p:cNvPicPr>
-            <a:picLocks noChangeAspect="1"/>
-          </p:cNvPicPr>
-          <p:nvPr/>
-        </p:nvPicPr>
-        <p:blipFill>
-          <a:blip r:embed="rId1"/>
-          <a:stretch>
-            <a:fillRect/>
-          </a:stretch>
-        </p:blipFill>
-        <p:spPr>
-          <a:xfrm>
-            <a:off x="11468100" y="106680"/>
-            <a:ext cx="715645" cy="626110"/>
-          </a:xfrm>
-          <a:prstGeom prst="rect">
-            <a:avLst/>
-          </a:prstGeom>
-        </p:spPr>
-      </p:pic>
-      <p:sp>
-        <p:nvSpPr>
-          <p:cNvPr id="3" name="TextBox 2"/>
-          <p:cNvSpPr txBox="1"/>
-          <p:nvPr/>
-        </p:nvSpPr>
-        <p:spPr>
-          <a:xfrm>
-            <a:off x="114300" y="223520"/>
-            <a:ext cx="11232515" cy="383540"/>
-          </a:xfrm>
-          <a:prstGeom prst="rect">
-            <a:avLst/>
-          </a:prstGeom>
-          <a:noFill/>
-        </p:spPr>
-        <p:txBody>
-          <a:bodyPr wrap="square" rtlCol="0">
-            <a:spAutoFit/>
-          </a:bodyPr>
-          <a:p>
-            <a:r>
-              <a:rPr lang="x-none" altLang="en-IN"/>
-              <a:t>Code overview</a:t>
-            </a:r>
-            <a:endParaRPr lang="x-none" altLang="en-IN"/>
-          </a:p>
-        </p:txBody>
-      </p:sp>
-      <p:pic>
-        <p:nvPicPr>
-          <p:cNvPr id="2" name="Picture 1"/>
-          <p:cNvPicPr>
-            <a:picLocks noChangeAspect="1"/>
-          </p:cNvPicPr>
-          <p:nvPr/>
-        </p:nvPicPr>
-        <p:blipFill>
-          <a:blip r:embed="rId2"/>
-          <a:stretch>
-            <a:fillRect/>
-          </a:stretch>
-        </p:blipFill>
-        <p:spPr>
-          <a:xfrm>
-            <a:off x="3437890" y="302895"/>
-            <a:ext cx="5458460" cy="6291580"/>
-          </a:xfrm>
-          <a:prstGeom prst="rect">
-            <a:avLst/>
-          </a:prstGeom>
-        </p:spPr>
-      </p:pic>
-      <p:sp>
-        <p:nvSpPr>
-          <p:cNvPr id="7" name="Right Arrow 6"/>
-          <p:cNvSpPr/>
-          <p:nvPr/>
-        </p:nvSpPr>
-        <p:spPr>
-          <a:xfrm>
-            <a:off x="610870" y="457200"/>
-            <a:ext cx="2779395" cy="1362710"/>
-          </a:xfrm>
-          <a:prstGeom prst="rightArrow">
-            <a:avLst/>
-          </a:prstGeom>
-        </p:spPr>
-        <p:style>
-          <a:lnRef idx="2">
-            <a:schemeClr val="accent1">
-              <a:shade val="50000"/>
-            </a:schemeClr>
-          </a:lnRef>
-          <a:fillRef idx="1">
-            <a:schemeClr val="accent1"/>
-          </a:fillRef>
-          <a:effectRef idx="0">
-            <a:schemeClr val="accent1"/>
-          </a:effectRef>
-          <a:fontRef idx="minor">
-            <a:schemeClr val="lt1"/>
-          </a:fontRef>
-        </p:style>
-        <p:txBody>
-          <a:bodyPr rtlCol="0" anchor="ctr"/>
-          <a:p>
-            <a:pPr algn="ctr"/>
-            <a:r>
-              <a:rPr lang="x-none" altLang="en-IN" sz="1600"/>
-              <a:t>1st sector bootloadar, </a:t>
-            </a:r>
-            <a:endParaRPr lang="x-none" altLang="en-IN" sz="1600"/>
-          </a:p>
-          <a:p>
-            <a:pPr algn="ctr"/>
-            <a:r>
-              <a:rPr lang="x-none" altLang="en-IN" sz="1600"/>
-              <a:t>2nd sector kernel</a:t>
-            </a:r>
-            <a:endParaRPr lang="x-none" altLang="en-IN" sz="1600"/>
-          </a:p>
-        </p:txBody>
-      </p:sp>
-      <p:pic>
-        <p:nvPicPr>
-          <p:cNvPr id="8" name="Picture 7"/>
-          <p:cNvPicPr>
-            <a:picLocks noChangeAspect="1"/>
-          </p:cNvPicPr>
-          <p:nvPr/>
-        </p:nvPicPr>
-        <p:blipFill>
-          <a:blip r:embed="rId3"/>
-          <a:stretch>
-            <a:fillRect/>
-          </a:stretch>
-        </p:blipFill>
-        <p:spPr>
-          <a:xfrm>
-            <a:off x="7875905" y="1361440"/>
-            <a:ext cx="4109720" cy="2823845"/>
-          </a:xfrm>
-          <a:prstGeom prst="rect">
-            <a:avLst/>
-          </a:prstGeom>
-        </p:spPr>
-      </p:pic>
-    </p:spTree>
-  </p:cSld>
-  <p:clrMapOvr>
-    <a:masterClrMapping/>
-  </p:clrMapOvr>
-</p:sld>
-</file>
-
-<file path=ppt/slides/slide15.xml><?xml version="1.0" encoding="utf-8"?>
-<p:sld xmlns:a="http://schemas.openxmlformats.org/drawingml/2006/main" xmlns:r="http://schemas.openxmlformats.org/officeDocument/2006/relationships" xmlns:p="http://schemas.openxmlformats.org/presentationml/2006/main">
-  <p:cSld>
-    <p:spTree>
-      <p:nvGrpSpPr>
-        <p:cNvPr id="1" name=""/>
-        <p:cNvGrpSpPr/>
-        <p:nvPr/>
-      </p:nvGrpSpPr>
-      <p:grpSpPr/>
-      <p:sp>
-        <p:nvSpPr>
-          <p:cNvPr id="4" name="Rectangle 3"/>
-          <p:cNvSpPr/>
-          <p:nvPr/>
-        </p:nvSpPr>
-        <p:spPr>
-          <a:xfrm>
-            <a:off x="-3175" y="-11430"/>
-            <a:ext cx="12186920" cy="102235"/>
-          </a:xfrm>
-          <a:prstGeom prst="rect">
-            <a:avLst/>
-          </a:prstGeom>
-        </p:spPr>
-        <p:style>
-          <a:lnRef idx="1">
-            <a:schemeClr val="accent1"/>
-          </a:lnRef>
-          <a:fillRef idx="2">
-            <a:schemeClr val="accent1"/>
-          </a:fillRef>
-          <a:effectRef idx="1">
-            <a:schemeClr val="accent1"/>
-          </a:effectRef>
-          <a:fontRef idx="minor">
-            <a:schemeClr val="dk1"/>
-          </a:fontRef>
-        </p:style>
-        <p:txBody>
-          <a:bodyPr rtlCol="0" anchor="ctr"/>
-          <a:p>
-            <a:pPr algn="ctr"/>
-            <a:endParaRPr lang="en-IN" altLang="en-US"/>
-          </a:p>
-        </p:txBody>
-      </p:sp>
-      <p:sp>
-        <p:nvSpPr>
-          <p:cNvPr id="5" name="Rectangle 4"/>
-          <p:cNvSpPr/>
-          <p:nvPr/>
-        </p:nvSpPr>
-        <p:spPr>
-          <a:xfrm>
-            <a:off x="-4445" y="6741160"/>
-            <a:ext cx="12186920" cy="102235"/>
-          </a:xfrm>
-          <a:prstGeom prst="rect">
-            <a:avLst/>
-          </a:prstGeom>
-        </p:spPr>
-        <p:style>
-          <a:lnRef idx="1">
-            <a:schemeClr val="accent1"/>
-          </a:lnRef>
-          <a:fillRef idx="2">
-            <a:schemeClr val="accent1"/>
-          </a:fillRef>
-          <a:effectRef idx="1">
-            <a:schemeClr val="accent1"/>
-          </a:effectRef>
-          <a:fontRef idx="minor">
-            <a:schemeClr val="dk1"/>
-          </a:fontRef>
-        </p:style>
-        <p:txBody>
-          <a:bodyPr rtlCol="0" anchor="ctr"/>
-          <a:p>
-            <a:pPr algn="ctr"/>
-            <a:endParaRPr lang="en-IN" altLang="en-US"/>
-          </a:p>
-        </p:txBody>
-      </p:sp>
-      <p:pic>
-        <p:nvPicPr>
-          <p:cNvPr id="6" name="Picture 5" descr="images"/>
-          <p:cNvPicPr>
-            <a:picLocks noChangeAspect="1"/>
-          </p:cNvPicPr>
-          <p:nvPr/>
-        </p:nvPicPr>
-        <p:blipFill>
-          <a:blip r:embed="rId1"/>
-          <a:stretch>
-            <a:fillRect/>
-          </a:stretch>
-        </p:blipFill>
-        <p:spPr>
-          <a:xfrm>
-            <a:off x="11468100" y="106680"/>
-            <a:ext cx="715645" cy="626110"/>
-          </a:xfrm>
-          <a:prstGeom prst="rect">
-            <a:avLst/>
-          </a:prstGeom>
-        </p:spPr>
-      </p:pic>
-      <p:sp>
-        <p:nvSpPr>
-          <p:cNvPr id="3" name="TextBox 2"/>
-          <p:cNvSpPr txBox="1"/>
-          <p:nvPr/>
-        </p:nvSpPr>
-        <p:spPr>
-          <a:xfrm>
-            <a:off x="114300" y="223520"/>
-            <a:ext cx="11232515" cy="383540"/>
-          </a:xfrm>
-          <a:prstGeom prst="rect">
-            <a:avLst/>
-          </a:prstGeom>
-          <a:noFill/>
-        </p:spPr>
-        <p:txBody>
-          <a:bodyPr wrap="square" rtlCol="0">
-            <a:spAutoFit/>
-          </a:bodyPr>
-          <a:p>
-            <a:r>
-              <a:rPr lang="x-none" altLang="en-IN"/>
-              <a:t>Code overview</a:t>
-            </a:r>
-            <a:endParaRPr lang="x-none" altLang="en-IN"/>
-          </a:p>
-        </p:txBody>
-      </p:sp>
-      <p:pic>
-        <p:nvPicPr>
-          <p:cNvPr id="2" name="Picture 1"/>
-          <p:cNvPicPr>
-            <a:picLocks noChangeAspect="1"/>
-          </p:cNvPicPr>
-          <p:nvPr/>
-        </p:nvPicPr>
-        <p:blipFill>
-          <a:blip r:embed="rId2"/>
-          <a:srcRect b="1297"/>
-          <a:stretch>
-            <a:fillRect/>
-          </a:stretch>
-        </p:blipFill>
-        <p:spPr>
-          <a:xfrm>
-            <a:off x="3477895" y="514350"/>
-            <a:ext cx="5263515" cy="5894070"/>
-          </a:xfrm>
-          <a:prstGeom prst="rect">
-            <a:avLst/>
-          </a:prstGeom>
-        </p:spPr>
-      </p:pic>
-    </p:spTree>
-  </p:cSld>
-  <p:clrMapOvr>
-    <a:masterClrMapping/>
-  </p:clrMapOvr>
-</p:sld>
-</file>
-
-<file path=ppt/slides/slide16.xml><?xml version="1.0" encoding="utf-8"?>
-<p:sld xmlns:a="http://schemas.openxmlformats.org/drawingml/2006/main" xmlns:r="http://schemas.openxmlformats.org/officeDocument/2006/relationships" xmlns:p="http://schemas.openxmlformats.org/presentationml/2006/main">
-  <p:cSld>
-    <p:spTree>
-      <p:nvGrpSpPr>
-        <p:cNvPr id="1" name=""/>
-        <p:cNvGrpSpPr/>
-        <p:nvPr/>
-      </p:nvGrpSpPr>
-      <p:grpSpPr/>
-      <p:sp>
-        <p:nvSpPr>
-          <p:cNvPr id="4" name="Rectangle 3"/>
-          <p:cNvSpPr/>
-          <p:nvPr/>
-        </p:nvSpPr>
-        <p:spPr>
-          <a:xfrm>
-            <a:off x="-3175" y="-11430"/>
-            <a:ext cx="12186920" cy="102235"/>
-          </a:xfrm>
-          <a:prstGeom prst="rect">
-            <a:avLst/>
-          </a:prstGeom>
-        </p:spPr>
-        <p:style>
-          <a:lnRef idx="1">
-            <a:schemeClr val="accent1"/>
-          </a:lnRef>
-          <a:fillRef idx="2">
-            <a:schemeClr val="accent1"/>
-          </a:fillRef>
-          <a:effectRef idx="1">
-            <a:schemeClr val="accent1"/>
-          </a:effectRef>
-          <a:fontRef idx="minor">
-            <a:schemeClr val="dk1"/>
-          </a:fontRef>
-        </p:style>
-        <p:txBody>
-          <a:bodyPr rtlCol="0" anchor="ctr"/>
-          <a:p>
-            <a:pPr algn="ctr"/>
-            <a:endParaRPr lang="en-IN" altLang="en-US"/>
-          </a:p>
-        </p:txBody>
-      </p:sp>
-      <p:sp>
-        <p:nvSpPr>
-          <p:cNvPr id="5" name="Rectangle 4"/>
-          <p:cNvSpPr/>
-          <p:nvPr/>
-        </p:nvSpPr>
-        <p:spPr>
-          <a:xfrm>
-            <a:off x="-4445" y="6741160"/>
-            <a:ext cx="12186920" cy="102235"/>
-          </a:xfrm>
-          <a:prstGeom prst="rect">
-            <a:avLst/>
-          </a:prstGeom>
-        </p:spPr>
-        <p:style>
-          <a:lnRef idx="1">
-            <a:schemeClr val="accent1"/>
-          </a:lnRef>
-          <a:fillRef idx="2">
-            <a:schemeClr val="accent1"/>
-          </a:fillRef>
-          <a:effectRef idx="1">
-            <a:schemeClr val="accent1"/>
-          </a:effectRef>
-          <a:fontRef idx="minor">
-            <a:schemeClr val="dk1"/>
-          </a:fontRef>
-        </p:style>
-        <p:txBody>
-          <a:bodyPr rtlCol="0" anchor="ctr"/>
-          <a:p>
-            <a:pPr algn="ctr"/>
-            <a:endParaRPr lang="en-IN" altLang="en-US"/>
-          </a:p>
-        </p:txBody>
-      </p:sp>
-      <p:pic>
-        <p:nvPicPr>
-          <p:cNvPr id="6" name="Picture 5" descr="images"/>
-          <p:cNvPicPr>
-            <a:picLocks noChangeAspect="1"/>
-          </p:cNvPicPr>
-          <p:nvPr/>
-        </p:nvPicPr>
-        <p:blipFill>
-          <a:blip r:embed="rId1"/>
-          <a:stretch>
-            <a:fillRect/>
-          </a:stretch>
-        </p:blipFill>
-        <p:spPr>
-          <a:xfrm>
-            <a:off x="11468100" y="106680"/>
-            <a:ext cx="715645" cy="626110"/>
-          </a:xfrm>
-          <a:prstGeom prst="rect">
-            <a:avLst/>
-          </a:prstGeom>
-        </p:spPr>
-      </p:pic>
-      <p:sp>
-        <p:nvSpPr>
-          <p:cNvPr id="3" name="TextBox 2"/>
-          <p:cNvSpPr txBox="1"/>
-          <p:nvPr/>
-        </p:nvSpPr>
-        <p:spPr>
-          <a:xfrm>
-            <a:off x="114300" y="223520"/>
-            <a:ext cx="11232515" cy="383540"/>
-          </a:xfrm>
-          <a:prstGeom prst="rect">
-            <a:avLst/>
-          </a:prstGeom>
-          <a:noFill/>
-        </p:spPr>
-        <p:txBody>
-          <a:bodyPr wrap="square" rtlCol="0">
-            <a:spAutoFit/>
-          </a:bodyPr>
-          <a:p>
-            <a:r>
-              <a:rPr lang="x-none" altLang="en-IN"/>
-              <a:t>Bootloading the kernel </a:t>
-            </a:r>
-            <a:endParaRPr lang="x-none" altLang="en-IN"/>
-          </a:p>
-        </p:txBody>
-      </p:sp>
-      <p:sp>
-        <p:nvSpPr>
-          <p:cNvPr id="7" name="TextBox 6"/>
-          <p:cNvSpPr txBox="1"/>
-          <p:nvPr/>
-        </p:nvSpPr>
-        <p:spPr>
-          <a:xfrm>
-            <a:off x="339725" y="738505"/>
-            <a:ext cx="11476990" cy="3675380"/>
-          </a:xfrm>
-          <a:prstGeom prst="rect">
-            <a:avLst/>
-          </a:prstGeom>
-          <a:noFill/>
-        </p:spPr>
-        <p:txBody>
-          <a:bodyPr wrap="square" rtlCol="0">
-            <a:spAutoFit/>
-          </a:bodyPr>
-          <a:p>
-            <a:pPr marL="285750" indent="-285750">
-              <a:buFont typeface="Arial" charset="0"/>
-              <a:buChar char="•"/>
-            </a:pPr>
-            <a:r>
-              <a:rPr lang="x-none" altLang="en-IN"/>
-              <a:t>x86 paging is not enabled</a:t>
-            </a:r>
-            <a:endParaRPr lang="x-none" altLang="en-IN"/>
-          </a:p>
-          <a:p>
-            <a:pPr marL="742950" lvl="1" indent="-285750">
-              <a:buFont typeface="Arial" charset="0"/>
-              <a:buChar char="•"/>
-            </a:pPr>
-            <a:r>
-              <a:rPr lang="x-none" altLang="en-IN"/>
-              <a:t>logical addresses = linear addresses = physical addresses</a:t>
-            </a:r>
-            <a:endParaRPr lang="x-none" altLang="en-IN"/>
-          </a:p>
-          <a:p>
-            <a:pPr marL="285750" lvl="0" indent="-285750">
-              <a:buFont typeface="Arial" charset="0"/>
-              <a:buChar char="•"/>
-            </a:pPr>
-            <a:r>
-              <a:rPr lang="x-none" altLang="en-IN"/>
-              <a:t>Bootloader loads kernel to 0x100000</a:t>
-            </a:r>
-            <a:endParaRPr lang="x-none" altLang="en-IN"/>
-          </a:p>
-          <a:p>
-            <a:pPr marL="742950" lvl="1" indent="-285750">
-              <a:buFont typeface="Arial" charset="0"/>
-              <a:buChar char="•"/>
-            </a:pPr>
-            <a:r>
-              <a:rPr lang="x-none" altLang="en-IN"/>
-              <a:t>Kernel is linked to use the virtual address 0x80100000</a:t>
-            </a:r>
-            <a:endParaRPr lang="x-none" altLang="en-IN"/>
-          </a:p>
-          <a:p>
-            <a:pPr marL="742950" lvl="1" indent="-285750">
-              <a:buFont typeface="Arial" charset="0"/>
-              <a:buChar char="•"/>
-            </a:pPr>
-            <a:r>
-              <a:rPr lang="x-none" altLang="en-IN"/>
-              <a:t>Can't load since there might not be physical memory at those locations</a:t>
-            </a:r>
-            <a:endParaRPr lang="x-none" altLang="en-IN"/>
-          </a:p>
-          <a:p>
-            <a:pPr marL="742950" lvl="1" indent="-285750">
-              <a:buFont typeface="Arial" charset="0"/>
-              <a:buChar char="•"/>
-            </a:pPr>
-            <a:r>
-              <a:rPr lang="x-none" altLang="en-IN"/>
-              <a:t>0xa0000:0x100000 might contain memory mapped I/O</a:t>
-            </a:r>
-            <a:endParaRPr lang="x-none" altLang="en-IN"/>
-          </a:p>
-          <a:p>
-            <a:pPr marL="285750" lvl="0" indent="-285750">
-              <a:buFont typeface="Arial" charset="0"/>
-              <a:buChar char="•"/>
-            </a:pPr>
-            <a:r>
-              <a:rPr lang="x-none" altLang="en-IN"/>
-              <a:t>Since the kernel is linked to use addresses starting at 0x80100000</a:t>
-            </a:r>
-            <a:endParaRPr lang="x-none" altLang="en-IN"/>
-          </a:p>
-          <a:p>
-            <a:pPr marL="742950" lvl="1" indent="-285750">
-              <a:buFont typeface="Arial" charset="0"/>
-              <a:buChar char="•"/>
-            </a:pPr>
-            <a:r>
-              <a:rPr lang="x-none" altLang="en-IN"/>
-              <a:t>We need to set up a page table</a:t>
-            </a:r>
-            <a:endParaRPr lang="x-none" altLang="en-IN"/>
-          </a:p>
-          <a:p>
-            <a:pPr marL="742950" lvl="1" indent="-285750">
-              <a:buFont typeface="Arial" charset="0"/>
-              <a:buChar char="•"/>
-            </a:pPr>
-            <a:r>
-              <a:rPr lang="x-none" altLang="en-IN"/>
-              <a:t>Maps addresses starting at 0x80000000 to physical address 0x00000000</a:t>
-            </a:r>
-            <a:endParaRPr lang="x-none" altLang="en-IN"/>
-          </a:p>
-          <a:p>
-            <a:pPr marL="742950" lvl="1" indent="-285750">
-              <a:buFont typeface="Arial" charset="0"/>
-              <a:buChar char="•"/>
-            </a:pPr>
-            <a:r>
-              <a:rPr lang="x-none" altLang="en-IN"/>
-              <a:t>* Also map addresses at 0x0 to physical address 0x000</a:t>
-            </a:r>
-            <a:r>
-              <a:rPr lang="x-none" altLang="en-IN">
-                <a:sym typeface="+mn-ea"/>
-              </a:rPr>
-              <a:t>00000</a:t>
-            </a:r>
-            <a:endParaRPr lang="x-none" altLang="en-IN">
-              <a:sym typeface="+mn-ea"/>
-            </a:endParaRPr>
-          </a:p>
-          <a:p>
-            <a:pPr marL="742950" lvl="1" indent="-285750">
-              <a:buFont typeface="Arial" charset="0"/>
-              <a:buChar char="•"/>
-            </a:pPr>
-            <a:r>
-              <a:rPr lang="x-none" altLang="en-IN"/>
-              <a:t>And start using page tables!</a:t>
-            </a:r>
-            <a:endParaRPr lang="x-none" altLang="en-IN"/>
-          </a:p>
-          <a:p>
-            <a:pPr marL="285750" lvl="0" indent="-285750">
-              <a:buFont typeface="Arial" charset="0"/>
-              <a:buChar char="•"/>
-            </a:pPr>
-            <a:r>
-              <a:rPr lang="x-none" altLang="en-IN"/>
-              <a:t>Also need to set up a stack</a:t>
-            </a:r>
-            <a:endParaRPr lang="x-none" altLang="en-IN"/>
-          </a:p>
-          <a:p>
-            <a:pPr marL="285750" lvl="0" indent="-285750">
-              <a:buFont typeface="Arial" charset="0"/>
-              <a:buChar char="•"/>
-            </a:pPr>
-            <a:r>
-              <a:rPr lang="x-none" altLang="en-IN"/>
-              <a:t>The lower address mapping can be removed, once we jump to higher addresses</a:t>
-            </a:r>
-            <a:endParaRPr lang="x-none" altLang="en-IN"/>
-          </a:p>
-        </p:txBody>
-      </p:sp>
-      <p:sp>
-        <p:nvSpPr>
-          <p:cNvPr id="8" name="Rectangle 7"/>
-          <p:cNvSpPr/>
-          <p:nvPr/>
-        </p:nvSpPr>
-        <p:spPr>
-          <a:xfrm>
-            <a:off x="9320530" y="918845"/>
-            <a:ext cx="2315845" cy="4156075"/>
-          </a:xfrm>
-          <a:prstGeom prst="rect">
-            <a:avLst/>
-          </a:prstGeom>
-        </p:spPr>
-        <p:style>
-          <a:lnRef idx="2">
-            <a:schemeClr val="accent6"/>
-          </a:lnRef>
-          <a:fillRef idx="1">
-            <a:schemeClr val="lt1"/>
-          </a:fillRef>
-          <a:effectRef idx="0">
-            <a:schemeClr val="accent6"/>
-          </a:effectRef>
-          <a:fontRef idx="minor">
-            <a:schemeClr val="dk1"/>
-          </a:fontRef>
-        </p:style>
-        <p:txBody>
-          <a:bodyPr rtlCol="0" anchor="ctr"/>
-          <a:p>
-            <a:pPr algn="ctr"/>
-            <a:endParaRPr lang="en-IN" altLang="en-US"/>
-          </a:p>
-        </p:txBody>
-      </p:sp>
-      <p:sp>
-        <p:nvSpPr>
-          <p:cNvPr id="9" name="Rectangle 8"/>
-          <p:cNvSpPr/>
-          <p:nvPr/>
-        </p:nvSpPr>
-        <p:spPr>
-          <a:xfrm>
-            <a:off x="9320530" y="4032250"/>
-            <a:ext cx="2315845" cy="655955"/>
-          </a:xfrm>
-          <a:prstGeom prst="rect">
-            <a:avLst/>
-          </a:prstGeom>
-        </p:spPr>
-        <p:style>
-          <a:lnRef idx="2">
-            <a:schemeClr val="accent6"/>
-          </a:lnRef>
-          <a:fillRef idx="1">
-            <a:schemeClr val="lt1"/>
-          </a:fillRef>
-          <a:effectRef idx="0">
-            <a:schemeClr val="accent6"/>
-          </a:effectRef>
-          <a:fontRef idx="minor">
-            <a:schemeClr val="dk1"/>
-          </a:fontRef>
-        </p:style>
-        <p:txBody>
-          <a:bodyPr rtlCol="0" anchor="ctr"/>
-          <a:p>
-            <a:pPr algn="ctr"/>
-            <a:r>
-              <a:rPr lang="x-none" altLang="en-IN"/>
-              <a:t>0xa0000:0x100000</a:t>
-            </a:r>
-            <a:endParaRPr lang="x-none" altLang="en-IN"/>
-          </a:p>
-        </p:txBody>
-      </p:sp>
-      <p:sp>
-        <p:nvSpPr>
-          <p:cNvPr id="10" name="Rectangle 9"/>
-          <p:cNvSpPr/>
-          <p:nvPr/>
-        </p:nvSpPr>
-        <p:spPr>
-          <a:xfrm>
-            <a:off x="9318625" y="3374390"/>
-            <a:ext cx="2315845" cy="655955"/>
-          </a:xfrm>
-          <a:prstGeom prst="rect">
-            <a:avLst/>
-          </a:prstGeom>
-        </p:spPr>
-        <p:style>
-          <a:lnRef idx="2">
-            <a:schemeClr val="accent6"/>
-          </a:lnRef>
-          <a:fillRef idx="1">
-            <a:schemeClr val="lt1"/>
-          </a:fillRef>
-          <a:effectRef idx="0">
-            <a:schemeClr val="accent6"/>
-          </a:effectRef>
-          <a:fontRef idx="minor">
-            <a:schemeClr val="dk1"/>
-          </a:fontRef>
-        </p:style>
-        <p:txBody>
-          <a:bodyPr rtlCol="0" anchor="ctr"/>
-          <a:p>
-            <a:pPr algn="ctr"/>
-            <a:r>
-              <a:rPr lang="x-none" altLang="en-IN"/>
-              <a:t>Kernel @</a:t>
-            </a:r>
-            <a:endParaRPr lang="x-none" altLang="en-IN"/>
-          </a:p>
-          <a:p>
-            <a:pPr algn="ctr"/>
-            <a:r>
-              <a:rPr lang="x-none" altLang="en-IN"/>
-              <a:t>0x100000</a:t>
-            </a:r>
-            <a:endParaRPr lang="x-none" altLang="en-IN"/>
-          </a:p>
-        </p:txBody>
-      </p:sp>
-      <p:sp>
-        <p:nvSpPr>
-          <p:cNvPr id="11" name="Rectangle 10"/>
-          <p:cNvSpPr/>
-          <p:nvPr/>
-        </p:nvSpPr>
-        <p:spPr>
-          <a:xfrm>
-            <a:off x="9317355" y="1288415"/>
-            <a:ext cx="2315845" cy="655955"/>
-          </a:xfrm>
-          <a:prstGeom prst="rect">
-            <a:avLst/>
-          </a:prstGeom>
-        </p:spPr>
-        <p:style>
-          <a:lnRef idx="2">
-            <a:schemeClr val="accent6"/>
-          </a:lnRef>
-          <a:fillRef idx="1">
-            <a:schemeClr val="lt1"/>
-          </a:fillRef>
-          <a:effectRef idx="0">
-            <a:schemeClr val="accent6"/>
-          </a:effectRef>
-          <a:fontRef idx="minor">
-            <a:schemeClr val="dk1"/>
-          </a:fontRef>
-        </p:style>
-        <p:txBody>
-          <a:bodyPr rtlCol="0" anchor="ctr"/>
-          <a:p>
-            <a:pPr algn="ctr"/>
-            <a:r>
-              <a:rPr lang="x-none" altLang="en-IN"/>
-              <a:t>Kernel linked @</a:t>
-            </a:r>
-            <a:endParaRPr lang="x-none" altLang="en-IN"/>
-          </a:p>
-          <a:p>
-            <a:pPr algn="ctr"/>
-            <a:r>
-              <a:rPr lang="x-none" altLang="en-IN"/>
-              <a:t>0x80100000</a:t>
-            </a:r>
-            <a:endParaRPr lang="x-none" altLang="en-IN"/>
-          </a:p>
-        </p:txBody>
-      </p:sp>
-    </p:spTree>
-  </p:cSld>
-  <p:clrMapOvr>
-    <a:masterClrMapping/>
-  </p:clrMapOvr>
-</p:sld>
-</file>
-
 <file path=ppt/slides/slide2.xml><?xml version="1.0" encoding="utf-8"?>
 <p:sld xmlns:a="http://schemas.openxmlformats.org/drawingml/2006/main" xmlns:r="http://schemas.openxmlformats.org/officeDocument/2006/relationships" xmlns:p="http://schemas.openxmlformats.org/presentationml/2006/main">
   <p:cSld>
@@ -7408,7 +5153,7 @@
         <p:spPr>
           <a:xfrm>
             <a:off x="191135" y="668020"/>
-            <a:ext cx="11618595" cy="3401060"/>
+            <a:ext cx="11618595" cy="3675380"/>
           </a:xfrm>
           <a:prstGeom prst="rect">
             <a:avLst/>
@@ -7540,6 +5285,29 @@
               <a:t>the control branches to a location in the kernel which handles system calls - just like exceptions and interrupts which we have studied before</a:t>
             </a:r>
             <a:endParaRPr lang="x-none" altLang="en-IN"/>
+          </a:p>
+          <a:p>
+            <a:pPr marL="1657350" lvl="3" indent="-285750">
+              <a:buFont typeface="Arial" charset="0"/>
+              <a:buChar char="•"/>
+            </a:pPr>
+            <a:r>
+              <a:rPr lang="x-none" altLang="en-IN"/>
+              <a:t>return is done using </a:t>
+            </a:r>
+            <a:r>
+              <a:rPr lang="x-none" altLang="en-IN">
+                <a:solidFill>
+                  <a:srgbClr val="FF0000"/>
+                </a:solidFill>
+              </a:rPr>
+              <a:t>iret</a:t>
+            </a:r>
+            <a:endParaRPr lang="x-none" altLang="en-IN">
+              <a:solidFill>
+                <a:srgbClr val="FF0000"/>
+              </a:solidFill>
+            </a:endParaRPr>
           </a:p>
           <a:p>
             <a:pPr marL="742950" lvl="1" indent="-285750">
@@ -7572,30 +5340,6 @@
         <p:nvPr/>
       </p:nvGrpSpPr>
       <p:grpSpPr/>
-      <p:pic>
-        <p:nvPicPr>
-          <p:cNvPr id="2" name="Picture 1"/>
-          <p:cNvPicPr>
-            <a:picLocks noChangeAspect="1"/>
-          </p:cNvPicPr>
-          <p:nvPr/>
-        </p:nvPicPr>
-        <p:blipFill>
-          <a:blip r:embed="rId1"/>
-          <a:stretch>
-            <a:fillRect/>
-          </a:stretch>
-        </p:blipFill>
-        <p:spPr>
-          <a:xfrm>
-            <a:off x="6605905" y="661670"/>
-            <a:ext cx="5314315" cy="5134610"/>
-          </a:xfrm>
-          <a:prstGeom prst="rect">
-            <a:avLst/>
-          </a:prstGeom>
-        </p:spPr>
-      </p:pic>
       <p:sp>
         <p:nvSpPr>
           <p:cNvPr id="4" name="Rectangle 3"/>
@@ -7679,7 +5423,7 @@
           <p:nvPr/>
         </p:nvPicPr>
         <p:blipFill>
-          <a:blip r:embed="rId2"/>
+          <a:blip r:embed="rId1"/>
           <a:stretch>
             <a:fillRect/>
           </a:stretch>
@@ -7717,7 +5461,7 @@
           <a:p>
             <a:r>
               <a:rPr lang="x-none" altLang="en-IN"/>
-              <a:t>Processes in the xv6 operating system</a:t>
+              <a:t>Setting up the xv6 operating system</a:t>
             </a:r>
             <a:endParaRPr lang="x-none" altLang="en-IN"/>
           </a:p>
@@ -7731,8 +5475,8 @@
         </p:nvSpPr>
         <p:spPr>
           <a:xfrm>
-            <a:off x="204470" y="668020"/>
-            <a:ext cx="5893435" cy="3126740"/>
+            <a:off x="191135" y="668020"/>
+            <a:ext cx="11618595" cy="5595620"/>
           </a:xfrm>
           <a:prstGeom prst="rect">
             <a:avLst/>
@@ -7744,35 +5488,68 @@
             <a:spAutoFit/>
           </a:bodyPr>
           <a:p>
-            <a:pPr marL="285750" indent="-285750">
+            <a:pPr lvl="0" indent="0">
+              <a:buFont typeface="Arial" charset="0"/>
+              <a:buNone/>
+            </a:pPr>
+            <a:r>
+              <a:rPr lang="x-none" altLang="en-IN"/>
+              <a:t>Linux based systems</a:t>
+            </a:r>
+            <a:endParaRPr lang="x-none" altLang="en-IN"/>
+          </a:p>
+          <a:p>
+            <a:pPr marL="285750" lvl="0" indent="-285750">
               <a:buFont typeface="Arial" charset="0"/>
               <a:buChar char="•"/>
             </a:pPr>
             <a:r>
               <a:rPr lang="x-none" altLang="en-IN"/>
-              <a:t>The unit of isolation is a process</a:t>
+              <a:t>Use git to obtain the latest source files </a:t>
             </a:r>
             <a:endParaRPr lang="x-none" altLang="en-IN"/>
           </a:p>
           <a:p>
-            <a:pPr marL="285750" indent="-285750">
+            <a:pPr lvl="1" indent="0">
+              <a:buFont typeface="Arial" charset="0"/>
+              <a:buNone/>
+            </a:pPr>
+            <a:r>
+              <a:rPr lang="x-none" altLang="en-IN"/>
+              <a:t>git clone git://github.com/mit-pdos/xv6-public.git</a:t>
+            </a:r>
+            <a:endParaRPr lang="x-none" altLang="en-IN"/>
+          </a:p>
+          <a:p>
+            <a:pPr marL="285750" lvl="0" indent="-285750">
               <a:buFont typeface="Arial" charset="0"/>
               <a:buChar char="•"/>
             </a:pPr>
             <a:r>
               <a:rPr lang="x-none" altLang="en-IN"/>
-              <a:t>An process gets the illusion that it is using a complete computer</a:t>
+              <a:t>Make sure that you have gcc installed</a:t>
             </a:r>
             <a:endParaRPr lang="x-none" altLang="en-IN"/>
           </a:p>
           <a:p>
+            <a:pPr marL="285750" lvl="0" indent="-285750">
+              <a:buFont typeface="Arial" charset="0"/>
+              <a:buChar char="•"/>
+            </a:pPr>
+            <a:r>
+              <a:rPr lang="x-none" altLang="en-IN"/>
+              <a:t>Make sure that you have qemu installed </a:t>
+            </a:r>
+            <a:endParaRPr lang="x-none" altLang="en-IN"/>
+          </a:p>
+          <a:p>
             <a:pPr marL="742950" lvl="1" indent="-285750">
               <a:buFont typeface="Arial" charset="0"/>
               <a:buChar char="•"/>
             </a:pPr>
             <a:r>
               <a:rPr lang="x-none" altLang="en-IN"/>
-              <a:t>Private address space</a:t>
+              <a:t>sudo apt-get install qemu</a:t>
             </a:r>
             <a:endParaRPr lang="x-none" altLang="en-IN"/>
           </a:p>
@@ -7783,7 +5560,7 @@
             </a:pPr>
             <a:r>
               <a:rPr lang="x-none" altLang="en-IN"/>
-              <a:t>xv6 needs to maintain separate page tables for virtual to physical address mapping</a:t>
+              <a:t>or obtain from www.qemu-project.org</a:t>
             </a:r>
             <a:endParaRPr lang="x-none" altLang="en-IN"/>
           </a:p>
@@ -7801,18 +5578,47 @@
             </a:pPr>
             <a:r>
               <a:rPr lang="x-none" altLang="en-IN"/>
-              <a:t>xv6 actually maps the kernel's code to a high memory area for each process. </a:t>
+              <a:t>run make qemu to start an instance of xv6 running on a qemu virtual machine</a:t>
             </a:r>
             <a:endParaRPr lang="x-none" altLang="en-IN"/>
           </a:p>
           <a:p>
+            <a:pPr marL="285750" lvl="0" indent="-285750">
+              <a:buFont typeface="Arial" charset="0"/>
+              <a:buChar char="•"/>
+            </a:pPr>
+            <a:endParaRPr lang="x-none" altLang="en-IN"/>
+          </a:p>
+          <a:p>
+            <a:pPr lvl="0" indent="0">
+              <a:buFont typeface="Arial" charset="0"/>
+              <a:buNone/>
+            </a:pPr>
+            <a:r>
+              <a:rPr lang="x-none" altLang="en-IN"/>
+              <a:t>Windows based systems</a:t>
+            </a:r>
+            <a:endParaRPr lang="x-none" altLang="en-IN"/>
+          </a:p>
+          <a:p>
+            <a:pPr marL="285750" lvl="0" indent="-285750">
+              <a:buFont typeface="Arial" charset="0"/>
+              <a:buChar char="•"/>
+            </a:pPr>
+            <a:r>
+              <a:rPr lang="x-none" altLang="en-IN"/>
+              <a:t>Use VMWare or Virtualbox to install Linux, enable networking</a:t>
+            </a:r>
+            <a:endParaRPr lang="x-none" altLang="en-IN"/>
+          </a:p>
+          <a:p>
             <a:pPr marL="742950" lvl="1" indent="-285750">
               <a:buFont typeface="Arial" charset="0"/>
               <a:buChar char="•"/>
             </a:pPr>
             <a:r>
               <a:rPr lang="x-none" altLang="en-IN"/>
-              <a:t>Syscalls execute in this memory area.</a:t>
+              <a:t>install gcc and associated tools </a:t>
             </a:r>
             <a:endParaRPr lang="x-none" altLang="en-IN"/>
           </a:p>
@@ -7823,7 +5629,69 @@
             </a:pPr>
             <a:r>
               <a:rPr lang="x-none" altLang="en-IN"/>
-              <a:t>Syscall routines can access user data directly</a:t>
+              <a:t>install qemu</a:t>
+            </a:r>
+            <a:endParaRPr lang="x-none" altLang="en-IN"/>
+          </a:p>
+          <a:p>
+            <a:pPr marL="742950" lvl="1" indent="-285750">
+              <a:buFont typeface="Arial" charset="0"/>
+              <a:buChar char="•"/>
+            </a:pPr>
+            <a:endParaRPr lang="x-none" altLang="en-IN"/>
+          </a:p>
+          <a:p>
+            <a:pPr lvl="0" indent="0">
+              <a:buFont typeface="Arial" charset="0"/>
+              <a:buNone/>
+            </a:pPr>
+            <a:r>
+              <a:rPr lang="x-none" altLang="en-IN"/>
+              <a:t>Modifying the operating system source code</a:t>
+            </a:r>
+            <a:endParaRPr lang="x-none" altLang="en-IN"/>
+          </a:p>
+          <a:p>
+            <a:pPr marL="285750" lvl="0" indent="-285750">
+              <a:buFont typeface="Arial" charset="0"/>
+              <a:buChar char="•"/>
+            </a:pPr>
+            <a:r>
+              <a:rPr lang="x-none" altLang="en-IN"/>
+              <a:t>Example - need to make the shell prompt say "AV224 $" instead of "$"</a:t>
+            </a:r>
+            <a:endParaRPr lang="x-none" altLang="en-IN"/>
+          </a:p>
+          <a:p>
+            <a:pPr marL="285750" lvl="0" indent="-285750">
+              <a:buFont typeface="Arial" charset="0"/>
+              <a:buChar char="•"/>
+            </a:pPr>
+            <a:r>
+              <a:rPr lang="x-none" altLang="en-IN"/>
+              <a:t>Use your favourite code editor</a:t>
+            </a:r>
+            <a:endParaRPr lang="x-none" altLang="en-IN"/>
+          </a:p>
+          <a:p>
+            <a:pPr marL="742950" lvl="1" indent="-285750">
+              <a:buFont typeface="Arial" charset="0"/>
+              <a:buChar char="•"/>
+            </a:pPr>
+            <a:r>
+              <a:rPr lang="x-none" altLang="en-IN"/>
+              <a:t>Edit sh.c</a:t>
+            </a:r>
+            <a:endParaRPr lang="x-none" altLang="en-IN"/>
+          </a:p>
+          <a:p>
+            <a:pPr marL="285750" lvl="0" indent="-285750">
+              <a:buFont typeface="Arial" charset="0"/>
+              <a:buChar char="•"/>
+            </a:pPr>
+            <a:r>
+              <a:rPr lang="x-none" altLang="en-IN"/>
+              <a:t>Do make qemu and observe the results</a:t>
             </a:r>
             <a:endParaRPr lang="x-none" altLang="en-IN"/>
           </a:p>
@@ -7968,7 +5836,7 @@
           <a:p>
             <a:r>
               <a:rPr lang="x-none" altLang="en-IN"/>
-              <a:t>Processes in the xv6 operating system</a:t>
+              <a:t>Project - phase I</a:t>
             </a:r>
             <a:endParaRPr lang="x-none" altLang="en-IN"/>
           </a:p>
@@ -7982,8 +5850,8 @@
         </p:nvSpPr>
         <p:spPr>
           <a:xfrm>
-            <a:off x="204470" y="668020"/>
-            <a:ext cx="5893435" cy="4772660"/>
+            <a:off x="191135" y="668020"/>
+            <a:ext cx="11618595" cy="4498340"/>
           </a:xfrm>
           <a:prstGeom prst="rect">
             <a:avLst/>
@@ -8001,7 +5869,7 @@
             </a:pPr>
             <a:r>
               <a:rPr lang="x-none" altLang="en-IN"/>
-              <a:t>xv6 maintains per process state within a structure</a:t>
+              <a:t>Choose whether you want to do the class project or not</a:t>
             </a:r>
             <a:endParaRPr lang="x-none" altLang="en-IN"/>
           </a:p>
@@ -8012,381 +5880,153 @@
             </a:pPr>
             <a:r>
               <a:rPr lang="x-none" altLang="en-IN"/>
-              <a:t>Each process has a thread of execution</a:t>
+              <a:t>Decide your group</a:t>
             </a:r>
             <a:endParaRPr lang="x-none" altLang="en-IN"/>
           </a:p>
           <a:p>
+            <a:pPr marL="285750" lvl="0" indent="-285750">
+              <a:buFont typeface="Arial" charset="0"/>
+              <a:buChar char="•"/>
+            </a:pPr>
+            <a:r>
+              <a:rPr lang="x-none" altLang="en-IN"/>
+              <a:t>Choose the operating system that you want to work with</a:t>
+            </a:r>
+            <a:endParaRPr lang="x-none" altLang="en-IN"/>
+          </a:p>
+          <a:p>
+            <a:pPr marL="285750" lvl="0" indent="-285750">
+              <a:buFont typeface="Arial" charset="0"/>
+              <a:buChar char="•"/>
+            </a:pPr>
+            <a:r>
+              <a:rPr lang="x-none" altLang="en-IN"/>
+              <a:t>Setup the operating system on a virtual machine on at least one laptop</a:t>
+            </a:r>
+            <a:endParaRPr lang="x-none" altLang="en-IN"/>
+          </a:p>
+          <a:p>
+            <a:pPr marL="285750" lvl="0" indent="-285750">
+              <a:buFont typeface="Arial" charset="0"/>
+              <a:buChar char="•"/>
+            </a:pPr>
+            <a:r>
+              <a:rPr lang="x-none" altLang="en-IN"/>
+              <a:t>Setup and test the development environment on your laptop</a:t>
+            </a:r>
+            <a:endParaRPr lang="x-none" altLang="en-IN"/>
+          </a:p>
+          <a:p>
             <a:pPr marL="742950" lvl="1" indent="-285750">
               <a:buFont typeface="Arial" charset="0"/>
               <a:buChar char="•"/>
             </a:pPr>
             <a:r>
               <a:rPr lang="x-none" altLang="en-IN"/>
-              <a:t>this is again an abstraction by xv6 that is used to indicate what is getting executed</a:t>
+              <a:t>Test whether a simple modification can be made and compiled</a:t>
             </a:r>
             <a:endParaRPr lang="x-none" altLang="en-IN"/>
           </a:p>
           <a:p>
-            <a:pPr marL="742950" lvl="1" indent="-285750">
+            <a:pPr marL="285750" lvl="0" indent="-285750">
               <a:buFont typeface="Arial" charset="0"/>
               <a:buChar char="•"/>
             </a:pPr>
             <a:r>
               <a:rPr lang="x-none" altLang="en-IN"/>
-              <a:t>a thread can be suspended and later resumed</a:t>
+              <a:t>Should be complete by 27/03/17</a:t>
             </a:r>
             <a:endParaRPr lang="x-none" altLang="en-IN"/>
           </a:p>
           <a:p>
-            <a:pPr marL="742950" lvl="1" indent="-285750">
+            <a:pPr lvl="0" indent="0">
+              <a:buFont typeface="Arial" charset="0"/>
+              <a:buNone/>
+            </a:pPr>
+            <a:endParaRPr lang="x-none" altLang="en-IN"/>
+          </a:p>
+          <a:p>
+            <a:pPr marL="285750" lvl="0" indent="-285750">
               <a:buFont typeface="Arial" charset="0"/>
               <a:buChar char="•"/>
             </a:pPr>
             <a:r>
               <a:rPr lang="x-none" altLang="en-IN"/>
-              <a:t>time sharing is done between threads</a:t>
+              <a:t>All groups should email a document consisting of</a:t>
             </a:r>
             <a:endParaRPr lang="x-none" altLang="en-IN"/>
           </a:p>
           <a:p>
-            <a:pPr marL="285750" lvl="0" indent="-285750">
-              <a:buFont typeface="Arial" charset="0"/>
-              <a:buChar char="•"/>
+            <a:pPr marL="800100" lvl="1" indent="-342900">
+              <a:buFont typeface="Arial" charset="0"/>
+              <a:buAutoNum type="arabicPeriod"/>
             </a:pPr>
             <a:r>
               <a:rPr lang="x-none" altLang="en-IN"/>
-              <a:t>A thread of execution has its own stack for storing process specific variables, function return addresses</a:t>
+              <a:t>The list of people in the group</a:t>
             </a:r>
             <a:endParaRPr lang="x-none" altLang="en-IN"/>
           </a:p>
           <a:p>
-            <a:pPr marL="285750" lvl="0" indent="-285750">
-              <a:buFont typeface="Arial" charset="0"/>
-              <a:buChar char="•"/>
+            <a:pPr marL="800100" lvl="1" indent="-342900">
+              <a:buFont typeface="Arial" charset="0"/>
+              <a:buAutoNum type="arabicPeriod"/>
             </a:pPr>
             <a:r>
               <a:rPr lang="x-none" altLang="en-IN"/>
-              <a:t>Associated with the kernel there is also another stack - the kernel stack, which is used when within the kernel mode</a:t>
+              <a:t>The operating system you have chosen</a:t>
             </a:r>
             <a:endParaRPr lang="x-none" altLang="en-IN"/>
           </a:p>
           <a:p>
-            <a:pPr marL="285750" lvl="0" indent="-285750">
-              <a:buFont typeface="Arial" charset="0"/>
-              <a:buChar char="•"/>
+            <a:pPr marL="800100" lvl="1" indent="-342900">
+              <a:buFont typeface="Arial" charset="0"/>
+              <a:buAutoNum type="arabicPeriod"/>
             </a:pPr>
             <a:r>
               <a:rPr lang="x-none" altLang="en-IN"/>
-              <a:t>What do the following mean?</a:t>
+              <a:t>The simple modification</a:t>
             </a:r>
             <a:endParaRPr lang="x-none" altLang="en-IN"/>
           </a:p>
           <a:p>
-            <a:pPr marL="742950" lvl="1" indent="-285750">
-              <a:buFont typeface="Arial" charset="0"/>
-              <a:buChar char="•"/>
+            <a:pPr marL="800100" lvl="1" indent="-342900">
+              <a:buFont typeface="Arial" charset="0"/>
+              <a:buAutoNum type="arabicPeriod"/>
             </a:pPr>
             <a:r>
               <a:rPr lang="x-none" altLang="en-IN"/>
-              <a:t>pgdir</a:t>
+              <a:t>A screenshot of the OS running on the virtual machine</a:t>
             </a:r>
             <a:endParaRPr lang="x-none" altLang="en-IN"/>
           </a:p>
           <a:p>
-            <a:pPr marL="742950" lvl="1" indent="-285750">
-              <a:buFont typeface="Arial" charset="0"/>
-              <a:buChar char="•"/>
+            <a:pPr lvl="1" indent="0">
+              <a:buFont typeface="Arial" charset="0"/>
+              <a:buNone/>
             </a:pPr>
             <a:r>
               <a:rPr lang="x-none" altLang="en-IN"/>
-              <a:t>state</a:t>
+              <a:t>to Arnab by 27/03/17</a:t>
             </a:r>
             <a:endParaRPr lang="x-none" altLang="en-IN"/>
           </a:p>
           <a:p>
-            <a:pPr marL="742950" lvl="1" indent="-285750">
-              <a:buFont typeface="Arial" charset="0"/>
-              <a:buChar char="•"/>
+            <a:pPr lvl="1" indent="0">
+              <a:buFont typeface="Arial" charset="0"/>
+              <a:buNone/>
+            </a:pPr>
+            <a:endParaRPr lang="x-none" altLang="en-IN"/>
+          </a:p>
+          <a:p>
+            <a:pPr lvl="1" indent="0">
+              <a:buFont typeface="Arial" charset="0"/>
+              <a:buNone/>
             </a:pPr>
             <a:r>
               <a:rPr lang="x-none" altLang="en-IN"/>
-              <a:t>pid</a:t>
-            </a:r>
-            <a:endParaRPr lang="x-none" altLang="en-IN"/>
-          </a:p>
-          <a:p>
-            <a:pPr marL="742950" lvl="1" indent="-285750">
-              <a:buFont typeface="Arial" charset="0"/>
-              <a:buChar char="•"/>
-            </a:pPr>
-            <a:endParaRPr lang="x-none" altLang="en-IN"/>
-          </a:p>
-          <a:p>
-            <a:pPr lvl="2" indent="0">
-              <a:buFont typeface="Arial" charset="0"/>
-              <a:buNone/>
-            </a:pPr>
-            <a:r>
-              <a:rPr lang="x-none" altLang="en-IN"/>
-              <a:t>	</a:t>
-            </a:r>
-            <a:endParaRPr lang="x-none" altLang="en-IN"/>
-          </a:p>
-        </p:txBody>
-      </p:sp>
-      <p:pic>
-        <p:nvPicPr>
-          <p:cNvPr id="7" name="Picture 6"/>
-          <p:cNvPicPr>
-            <a:picLocks noChangeAspect="1"/>
-          </p:cNvPicPr>
-          <p:nvPr/>
-        </p:nvPicPr>
-        <p:blipFill>
-          <a:blip r:embed="rId2"/>
-          <a:stretch>
-            <a:fillRect/>
-          </a:stretch>
-        </p:blipFill>
-        <p:spPr>
-          <a:xfrm>
-            <a:off x="6096635" y="1005205"/>
-            <a:ext cx="5990590" cy="4733925"/>
-          </a:xfrm>
-          <a:prstGeom prst="rect">
-            <a:avLst/>
-          </a:prstGeom>
-        </p:spPr>
-      </p:pic>
-    </p:spTree>
-  </p:cSld>
-  <p:clrMapOvr>
-    <a:masterClrMapping/>
-  </p:clrMapOvr>
-</p:sld>
-</file>
-
-<file path=ppt/slides/slide9.xml><?xml version="1.0" encoding="utf-8"?>
-<p:sld xmlns:a="http://schemas.openxmlformats.org/drawingml/2006/main" xmlns:r="http://schemas.openxmlformats.org/officeDocument/2006/relationships" xmlns:p="http://schemas.openxmlformats.org/presentationml/2006/main">
-  <p:cSld>
-    <p:spTree>
-      <p:nvGrpSpPr>
-        <p:cNvPr id="1" name=""/>
-        <p:cNvGrpSpPr/>
-        <p:nvPr/>
-      </p:nvGrpSpPr>
-      <p:grpSpPr/>
-      <p:sp>
-        <p:nvSpPr>
-          <p:cNvPr id="4" name="Rectangle 3"/>
-          <p:cNvSpPr/>
-          <p:nvPr/>
-        </p:nvSpPr>
-        <p:spPr>
-          <a:xfrm>
-            <a:off x="-3175" y="-11430"/>
-            <a:ext cx="12186920" cy="102235"/>
-          </a:xfrm>
-          <a:prstGeom prst="rect">
-            <a:avLst/>
-          </a:prstGeom>
-        </p:spPr>
-        <p:style>
-          <a:lnRef idx="1">
-            <a:schemeClr val="accent1"/>
-          </a:lnRef>
-          <a:fillRef idx="2">
-            <a:schemeClr val="accent1"/>
-          </a:fillRef>
-          <a:effectRef idx="1">
-            <a:schemeClr val="accent1"/>
-          </a:effectRef>
-          <a:fontRef idx="minor">
-            <a:schemeClr val="dk1"/>
-          </a:fontRef>
-        </p:style>
-        <p:txBody>
-          <a:bodyPr rtlCol="0" anchor="ctr"/>
-          <a:p>
-            <a:pPr algn="ctr"/>
-            <a:endParaRPr lang="en-IN" altLang="en-US"/>
-          </a:p>
-        </p:txBody>
-      </p:sp>
-      <p:sp>
-        <p:nvSpPr>
-          <p:cNvPr id="5" name="Rectangle 4"/>
-          <p:cNvSpPr/>
-          <p:nvPr/>
-        </p:nvSpPr>
-        <p:spPr>
-          <a:xfrm>
-            <a:off x="-4445" y="6741160"/>
-            <a:ext cx="12186920" cy="102235"/>
-          </a:xfrm>
-          <a:prstGeom prst="rect">
-            <a:avLst/>
-          </a:prstGeom>
-        </p:spPr>
-        <p:style>
-          <a:lnRef idx="1">
-            <a:schemeClr val="accent1"/>
-          </a:lnRef>
-          <a:fillRef idx="2">
-            <a:schemeClr val="accent1"/>
-          </a:fillRef>
-          <a:effectRef idx="1">
-            <a:schemeClr val="accent1"/>
-          </a:effectRef>
-          <a:fontRef idx="minor">
-            <a:schemeClr val="dk1"/>
-          </a:fontRef>
-        </p:style>
-        <p:txBody>
-          <a:bodyPr rtlCol="0" anchor="ctr"/>
-          <a:p>
-            <a:pPr algn="ctr"/>
-            <a:endParaRPr lang="en-IN" altLang="en-US"/>
-          </a:p>
-        </p:txBody>
-      </p:sp>
-      <p:pic>
-        <p:nvPicPr>
-          <p:cNvPr id="6" name="Picture 5" descr="images"/>
-          <p:cNvPicPr>
-            <a:picLocks noChangeAspect="1"/>
-          </p:cNvPicPr>
-          <p:nvPr/>
-        </p:nvPicPr>
-        <p:blipFill>
-          <a:blip r:embed="rId1"/>
-          <a:stretch>
-            <a:fillRect/>
-          </a:stretch>
-        </p:blipFill>
-        <p:spPr>
-          <a:xfrm>
-            <a:off x="11468100" y="106680"/>
-            <a:ext cx="715645" cy="626110"/>
-          </a:xfrm>
-          <a:prstGeom prst="rect">
-            <a:avLst/>
-          </a:prstGeom>
-        </p:spPr>
-      </p:pic>
-      <p:sp>
-        <p:nvSpPr>
-          <p:cNvPr id="3" name="TextBox 2"/>
-          <p:cNvSpPr txBox="1"/>
-          <p:nvPr/>
-        </p:nvSpPr>
-        <p:spPr>
-          <a:xfrm>
-            <a:off x="114300" y="223520"/>
-            <a:ext cx="11232515" cy="383540"/>
-          </a:xfrm>
-          <a:prstGeom prst="rect">
-            <a:avLst/>
-          </a:prstGeom>
-          <a:noFill/>
-        </p:spPr>
-        <p:txBody>
-          <a:bodyPr wrap="square" rtlCol="0">
-            <a:spAutoFit/>
-          </a:bodyPr>
-          <a:p>
-            <a:r>
-              <a:rPr lang="x-none" altLang="en-IN"/>
-              <a:t>How is the first process run?</a:t>
-            </a:r>
-            <a:endParaRPr lang="x-none" altLang="en-IN"/>
-          </a:p>
-        </p:txBody>
-      </p:sp>
-      <p:sp>
-        <p:nvSpPr>
-          <p:cNvPr id="2" name="TextBox 1"/>
-          <p:cNvSpPr txBox="1"/>
-          <p:nvPr/>
-        </p:nvSpPr>
-        <p:spPr>
-          <a:xfrm>
-            <a:off x="300990" y="789305"/>
-            <a:ext cx="11541760" cy="1755140"/>
-          </a:xfrm>
-          <a:prstGeom prst="rect">
-            <a:avLst/>
-          </a:prstGeom>
-          <a:noFill/>
-        </p:spPr>
-        <p:txBody>
-          <a:bodyPr wrap="square" rtlCol="0">
-            <a:spAutoFit/>
-          </a:bodyPr>
-          <a:p>
-            <a:pPr marL="285750" indent="-285750">
-              <a:buFont typeface="Arial" charset="0"/>
-              <a:buChar char="•"/>
-            </a:pPr>
-            <a:r>
-              <a:rPr lang="x-none" altLang="en-IN"/>
-              <a:t>Demonstrations will be done in QEMU - how to go through QEMU in step by step?</a:t>
-            </a:r>
-            <a:endParaRPr lang="x-none" altLang="en-IN"/>
-          </a:p>
-          <a:p>
-            <a:pPr marL="285750" indent="-285750">
-              <a:buFont typeface="Arial" charset="0"/>
-              <a:buChar char="•"/>
-            </a:pPr>
-            <a:r>
-              <a:rPr lang="x-none" altLang="en-IN"/>
-              <a:t>Booting of xv6 (demonstrations in QEMU)</a:t>
-            </a:r>
-            <a:endParaRPr lang="x-none" altLang="en-IN"/>
-          </a:p>
-          <a:p>
-            <a:pPr marL="285750" indent="-285750">
-              <a:buFont typeface="Arial" charset="0"/>
-              <a:buChar char="•"/>
-            </a:pPr>
-            <a:r>
-              <a:rPr lang="x-none" altLang="en-IN"/>
-              <a:t>Loading of xv6 kernel</a:t>
-            </a:r>
-            <a:endParaRPr lang="x-none" altLang="en-IN"/>
-          </a:p>
-          <a:p>
-            <a:pPr marL="285750" indent="-285750">
-              <a:buFont typeface="Arial" charset="0"/>
-              <a:buChar char="•"/>
-            </a:pPr>
-            <a:r>
-              <a:rPr lang="x-none" altLang="en-IN"/>
-              <a:t>How does the kernel create its own address space?</a:t>
-            </a:r>
-            <a:endParaRPr lang="x-none" altLang="en-IN"/>
-          </a:p>
-          <a:p>
-            <a:pPr marL="285750" indent="-285750">
-              <a:buFont typeface="Arial" charset="0"/>
-              <a:buChar char="•"/>
-            </a:pPr>
-            <a:r>
-              <a:rPr lang="x-none" altLang="en-IN"/>
-              <a:t>Creating and running the first process (a shell?)</a:t>
-            </a:r>
-            <a:endParaRPr lang="x-none" altLang="en-IN"/>
-          </a:p>
-          <a:p>
-            <a:pPr marL="285750" indent="-285750">
-              <a:buFont typeface="Arial" charset="0"/>
-              <a:buChar char="•"/>
-            </a:pPr>
-            <a:r>
-              <a:rPr lang="x-none" altLang="en-IN"/>
-              <a:t>The first process using a system call</a:t>
+              <a:t>Arnab should consolidate all the documents and email to me.</a:t>
             </a:r>
             <a:endParaRPr lang="x-none" altLang="en-IN"/>
           </a:p>

</xml_diff>